<commit_message>
wbs no date time
wbs no date time
</commit_message>
<xml_diff>
--- a/Presentation project.pptx
+++ b/Presentation project.pptx
@@ -9,6 +9,7 @@
     <p:sldId id="257" r:id="rId3"/>
     <p:sldId id="258" r:id="rId4"/>
     <p:sldId id="259" r:id="rId5"/>
+    <p:sldId id="260" r:id="rId6"/>
   </p:sldIdLst>
   <p:sldSz cx="12192000" cy="6858000"/>
   <p:notesSz cx="6858000" cy="9144000"/>
@@ -4526,6 +4527,14 @@
 <file path=ppt/slides/slide3.xml><?xml version="1.0" encoding="utf-8"?>
 <p:sld xmlns:a="http://schemas.openxmlformats.org/drawingml/2006/main" xmlns:r="http://schemas.openxmlformats.org/officeDocument/2006/relationships" xmlns:p="http://schemas.openxmlformats.org/presentationml/2006/main">
   <p:cSld>
+    <p:bg>
+      <p:bgPr>
+        <a:solidFill>
+          <a:schemeClr val="bg1"/>
+        </a:solidFill>
+        <a:effectLst/>
+      </p:bgPr>
+    </p:bg>
     <p:spTree>
       <p:nvGrpSpPr>
         <p:cNvPr id="1" name=""/>
@@ -4540,6 +4549,66 @@
           <a:chExt cx="0" cy="0"/>
         </a:xfrm>
       </p:grpSpPr>
+      <p:sp useBgFill="1">
+        <p:nvSpPr>
+          <p:cNvPr id="14" name="Rectangle 7">
+            <a:extLst>
+              <a:ext uri="{FF2B5EF4-FFF2-40B4-BE49-F238E27FC236}">
+                <a16:creationId xmlns:a16="http://schemas.microsoft.com/office/drawing/2014/main" id="{100EDD19-6802-4EC3-95CE-CFFAB042CFD6}"/>
+              </a:ext>
+              <a:ext uri="{C183D7F6-B498-43B3-948B-1728B52AA6E4}">
+                <adec:decorative xmlns:adec="http://schemas.microsoft.com/office/drawing/2017/decorative" val="1"/>
+              </a:ext>
+            </a:extLst>
+          </p:cNvPr>
+          <p:cNvSpPr>
+            <a:spLocks noGrp="1" noRot="1" noChangeAspect="1" noMove="1" noResize="1" noEditPoints="1" noAdjustHandles="1" noChangeArrowheads="1" noChangeShapeType="1" noTextEdit="1"/>
+          </p:cNvSpPr>
+          <p:nvPr>
+            <p:extLst>
+              <p:ext uri="{386F3935-93C4-4BCD-93E2-E3B085C9AB24}">
+                <p16:designElem xmlns:p16="http://schemas.microsoft.com/office/powerpoint/2015/main" val="1"/>
+              </p:ext>
+            </p:extLst>
+          </p:nvPr>
+        </p:nvSpPr>
+        <p:spPr>
+          <a:xfrm>
+            <a:off x="0" y="0"/>
+            <a:ext cx="12188952" cy="6858000"/>
+          </a:xfrm>
+          <a:prstGeom prst="rect">
+            <a:avLst/>
+          </a:prstGeom>
+          <a:ln>
+            <a:noFill/>
+          </a:ln>
+        </p:spPr>
+        <p:style>
+          <a:lnRef idx="2">
+            <a:schemeClr val="accent1">
+              <a:shade val="50000"/>
+            </a:schemeClr>
+          </a:lnRef>
+          <a:fillRef idx="1">
+            <a:schemeClr val="accent1"/>
+          </a:fillRef>
+          <a:effectRef idx="0">
+            <a:schemeClr val="accent1"/>
+          </a:effectRef>
+          <a:fontRef idx="minor">
+            <a:schemeClr val="lt1"/>
+          </a:fontRef>
+        </p:style>
+        <p:txBody>
+          <a:bodyPr rtlCol="0" anchor="ctr"/>
+          <a:lstStyle/>
+          <a:p>
+            <a:pPr algn="ctr"/>
+            <a:endParaRPr lang="en-US"/>
+          </a:p>
+        </p:txBody>
+      </p:sp>
       <p:sp>
         <p:nvSpPr>
           <p:cNvPr id="2" name="Title 1">
@@ -4556,16 +4625,669 @@
             <p:ph type="title"/>
           </p:nvPr>
         </p:nvSpPr>
-        <p:spPr/>
-        <p:txBody>
-          <a:bodyPr/>
+        <p:spPr>
+          <a:xfrm>
+            <a:off x="838200" y="365125"/>
+            <a:ext cx="10515600" cy="1325563"/>
+          </a:xfrm>
+        </p:spPr>
+        <p:txBody>
+          <a:bodyPr>
+            <a:normAutofit/>
+          </a:bodyPr>
           <a:lstStyle/>
           <a:p>
             <a:r>
-              <a:rPr lang="nl-NL" dirty="0" err="1"/>
-              <a:t>wbs</a:t>
-            </a:r>
-            <a:endParaRPr lang="nl-BE" dirty="0"/>
+              <a:rPr lang="nl-NL" sz="5400" dirty="0" err="1"/>
+              <a:t>Work</a:t>
+            </a:r>
+            <a:r>
+              <a:rPr lang="nl-NL" sz="5400" dirty="0"/>
+              <a:t> breakdown </a:t>
+            </a:r>
+            <a:r>
+              <a:rPr lang="nl-NL" sz="5400" dirty="0" err="1"/>
+              <a:t>structure</a:t>
+            </a:r>
+            <a:endParaRPr lang="nl-BE" sz="5400" dirty="0"/>
+          </a:p>
+        </p:txBody>
+      </p:sp>
+      <p:sp>
+        <p:nvSpPr>
+          <p:cNvPr id="15" name="sketch line">
+            <a:extLst>
+              <a:ext uri="{FF2B5EF4-FFF2-40B4-BE49-F238E27FC236}">
+                <a16:creationId xmlns:a16="http://schemas.microsoft.com/office/drawing/2014/main" id="{DB17E863-922E-4C26-BD64-E8FD41D28661}"/>
+              </a:ext>
+              <a:ext uri="{C183D7F6-B498-43B3-948B-1728B52AA6E4}">
+                <adec:decorative xmlns:adec="http://schemas.microsoft.com/office/drawing/2017/decorative" val="1"/>
+              </a:ext>
+            </a:extLst>
+          </p:cNvPr>
+          <p:cNvSpPr>
+            <a:spLocks noGrp="1" noRot="1" noChangeAspect="1" noMove="1" noResize="1" noEditPoints="1" noAdjustHandles="1" noChangeArrowheads="1" noChangeShapeType="1" noTextEdit="1"/>
+          </p:cNvSpPr>
+          <p:nvPr>
+            <p:extLst>
+              <p:ext uri="{386F3935-93C4-4BCD-93E2-E3B085C9AB24}">
+                <p16:designElem xmlns:p16="http://schemas.microsoft.com/office/powerpoint/2015/main" val="1"/>
+              </p:ext>
+            </p:extLst>
+          </p:nvPr>
+        </p:nvSpPr>
+        <p:spPr>
+          <a:xfrm>
+            <a:off x="669036" y="1677373"/>
+            <a:ext cx="10853928" cy="18288"/>
+          </a:xfrm>
+          <a:custGeom>
+            <a:avLst/>
+            <a:gdLst>
+              <a:gd name="connsiteX0" fmla="*/ 0 w 10853928"/>
+              <a:gd name="connsiteY0" fmla="*/ 0 h 18288"/>
+              <a:gd name="connsiteX1" fmla="*/ 461292 w 10853928"/>
+              <a:gd name="connsiteY1" fmla="*/ 0 h 18288"/>
+              <a:gd name="connsiteX2" fmla="*/ 1139662 w 10853928"/>
+              <a:gd name="connsiteY2" fmla="*/ 0 h 18288"/>
+              <a:gd name="connsiteX3" fmla="*/ 1926572 w 10853928"/>
+              <a:gd name="connsiteY3" fmla="*/ 0 h 18288"/>
+              <a:gd name="connsiteX4" fmla="*/ 2279325 w 10853928"/>
+              <a:gd name="connsiteY4" fmla="*/ 0 h 18288"/>
+              <a:gd name="connsiteX5" fmla="*/ 2632078 w 10853928"/>
+              <a:gd name="connsiteY5" fmla="*/ 0 h 18288"/>
+              <a:gd name="connsiteX6" fmla="*/ 3527527 w 10853928"/>
+              <a:gd name="connsiteY6" fmla="*/ 0 h 18288"/>
+              <a:gd name="connsiteX7" fmla="*/ 4205897 w 10853928"/>
+              <a:gd name="connsiteY7" fmla="*/ 0 h 18288"/>
+              <a:gd name="connsiteX8" fmla="*/ 4558650 w 10853928"/>
+              <a:gd name="connsiteY8" fmla="*/ 0 h 18288"/>
+              <a:gd name="connsiteX9" fmla="*/ 5237020 w 10853928"/>
+              <a:gd name="connsiteY9" fmla="*/ 0 h 18288"/>
+              <a:gd name="connsiteX10" fmla="*/ 6132469 w 10853928"/>
+              <a:gd name="connsiteY10" fmla="*/ 0 h 18288"/>
+              <a:gd name="connsiteX11" fmla="*/ 6702301 w 10853928"/>
+              <a:gd name="connsiteY11" fmla="*/ 0 h 18288"/>
+              <a:gd name="connsiteX12" fmla="*/ 7272132 w 10853928"/>
+              <a:gd name="connsiteY12" fmla="*/ 0 h 18288"/>
+              <a:gd name="connsiteX13" fmla="*/ 7950502 w 10853928"/>
+              <a:gd name="connsiteY13" fmla="*/ 0 h 18288"/>
+              <a:gd name="connsiteX14" fmla="*/ 8737412 w 10853928"/>
+              <a:gd name="connsiteY14" fmla="*/ 0 h 18288"/>
+              <a:gd name="connsiteX15" fmla="*/ 9524322 w 10853928"/>
+              <a:gd name="connsiteY15" fmla="*/ 0 h 18288"/>
+              <a:gd name="connsiteX16" fmla="*/ 10853928 w 10853928"/>
+              <a:gd name="connsiteY16" fmla="*/ 0 h 18288"/>
+              <a:gd name="connsiteX17" fmla="*/ 10853928 w 10853928"/>
+              <a:gd name="connsiteY17" fmla="*/ 18288 h 18288"/>
+              <a:gd name="connsiteX18" fmla="*/ 10392636 w 10853928"/>
+              <a:gd name="connsiteY18" fmla="*/ 18288 h 18288"/>
+              <a:gd name="connsiteX19" fmla="*/ 9497187 w 10853928"/>
+              <a:gd name="connsiteY19" fmla="*/ 18288 h 18288"/>
+              <a:gd name="connsiteX20" fmla="*/ 8818817 w 10853928"/>
+              <a:gd name="connsiteY20" fmla="*/ 18288 h 18288"/>
+              <a:gd name="connsiteX21" fmla="*/ 8466064 w 10853928"/>
+              <a:gd name="connsiteY21" fmla="*/ 18288 h 18288"/>
+              <a:gd name="connsiteX22" fmla="*/ 7787693 w 10853928"/>
+              <a:gd name="connsiteY22" fmla="*/ 18288 h 18288"/>
+              <a:gd name="connsiteX23" fmla="*/ 7217862 w 10853928"/>
+              <a:gd name="connsiteY23" fmla="*/ 18288 h 18288"/>
+              <a:gd name="connsiteX24" fmla="*/ 6648031 w 10853928"/>
+              <a:gd name="connsiteY24" fmla="*/ 18288 h 18288"/>
+              <a:gd name="connsiteX25" fmla="*/ 6078200 w 10853928"/>
+              <a:gd name="connsiteY25" fmla="*/ 18288 h 18288"/>
+              <a:gd name="connsiteX26" fmla="*/ 5508368 w 10853928"/>
+              <a:gd name="connsiteY26" fmla="*/ 18288 h 18288"/>
+              <a:gd name="connsiteX27" fmla="*/ 4721459 w 10853928"/>
+              <a:gd name="connsiteY27" fmla="*/ 18288 h 18288"/>
+              <a:gd name="connsiteX28" fmla="*/ 4043088 w 10853928"/>
+              <a:gd name="connsiteY28" fmla="*/ 18288 h 18288"/>
+              <a:gd name="connsiteX29" fmla="*/ 3690336 w 10853928"/>
+              <a:gd name="connsiteY29" fmla="*/ 18288 h 18288"/>
+              <a:gd name="connsiteX30" fmla="*/ 3120504 w 10853928"/>
+              <a:gd name="connsiteY30" fmla="*/ 18288 h 18288"/>
+              <a:gd name="connsiteX31" fmla="*/ 2333595 w 10853928"/>
+              <a:gd name="connsiteY31" fmla="*/ 18288 h 18288"/>
+              <a:gd name="connsiteX32" fmla="*/ 1872303 w 10853928"/>
+              <a:gd name="connsiteY32" fmla="*/ 18288 h 18288"/>
+              <a:gd name="connsiteX33" fmla="*/ 976854 w 10853928"/>
+              <a:gd name="connsiteY33" fmla="*/ 18288 h 18288"/>
+              <a:gd name="connsiteX34" fmla="*/ 0 w 10853928"/>
+              <a:gd name="connsiteY34" fmla="*/ 18288 h 18288"/>
+              <a:gd name="connsiteX35" fmla="*/ 0 w 10853928"/>
+              <a:gd name="connsiteY35" fmla="*/ 0 h 18288"/>
+            </a:gdLst>
+            <a:ahLst/>
+            <a:cxnLst>
+              <a:cxn ang="0">
+                <a:pos x="connsiteX0" y="connsiteY0"/>
+              </a:cxn>
+              <a:cxn ang="0">
+                <a:pos x="connsiteX1" y="connsiteY1"/>
+              </a:cxn>
+              <a:cxn ang="0">
+                <a:pos x="connsiteX2" y="connsiteY2"/>
+              </a:cxn>
+              <a:cxn ang="0">
+                <a:pos x="connsiteX3" y="connsiteY3"/>
+              </a:cxn>
+              <a:cxn ang="0">
+                <a:pos x="connsiteX4" y="connsiteY4"/>
+              </a:cxn>
+              <a:cxn ang="0">
+                <a:pos x="connsiteX5" y="connsiteY5"/>
+              </a:cxn>
+              <a:cxn ang="0">
+                <a:pos x="connsiteX6" y="connsiteY6"/>
+              </a:cxn>
+              <a:cxn ang="0">
+                <a:pos x="connsiteX7" y="connsiteY7"/>
+              </a:cxn>
+              <a:cxn ang="0">
+                <a:pos x="connsiteX8" y="connsiteY8"/>
+              </a:cxn>
+              <a:cxn ang="0">
+                <a:pos x="connsiteX9" y="connsiteY9"/>
+              </a:cxn>
+              <a:cxn ang="0">
+                <a:pos x="connsiteX10" y="connsiteY10"/>
+              </a:cxn>
+              <a:cxn ang="0">
+                <a:pos x="connsiteX11" y="connsiteY11"/>
+              </a:cxn>
+              <a:cxn ang="0">
+                <a:pos x="connsiteX12" y="connsiteY12"/>
+              </a:cxn>
+              <a:cxn ang="0">
+                <a:pos x="connsiteX13" y="connsiteY13"/>
+              </a:cxn>
+              <a:cxn ang="0">
+                <a:pos x="connsiteX14" y="connsiteY14"/>
+              </a:cxn>
+              <a:cxn ang="0">
+                <a:pos x="connsiteX15" y="connsiteY15"/>
+              </a:cxn>
+              <a:cxn ang="0">
+                <a:pos x="connsiteX16" y="connsiteY16"/>
+              </a:cxn>
+              <a:cxn ang="0">
+                <a:pos x="connsiteX17" y="connsiteY17"/>
+              </a:cxn>
+              <a:cxn ang="0">
+                <a:pos x="connsiteX18" y="connsiteY18"/>
+              </a:cxn>
+              <a:cxn ang="0">
+                <a:pos x="connsiteX19" y="connsiteY19"/>
+              </a:cxn>
+              <a:cxn ang="0">
+                <a:pos x="connsiteX20" y="connsiteY20"/>
+              </a:cxn>
+              <a:cxn ang="0">
+                <a:pos x="connsiteX21" y="connsiteY21"/>
+              </a:cxn>
+              <a:cxn ang="0">
+                <a:pos x="connsiteX22" y="connsiteY22"/>
+              </a:cxn>
+              <a:cxn ang="0">
+                <a:pos x="connsiteX23" y="connsiteY23"/>
+              </a:cxn>
+              <a:cxn ang="0">
+                <a:pos x="connsiteX24" y="connsiteY24"/>
+              </a:cxn>
+              <a:cxn ang="0">
+                <a:pos x="connsiteX25" y="connsiteY25"/>
+              </a:cxn>
+              <a:cxn ang="0">
+                <a:pos x="connsiteX26" y="connsiteY26"/>
+              </a:cxn>
+              <a:cxn ang="0">
+                <a:pos x="connsiteX27" y="connsiteY27"/>
+              </a:cxn>
+              <a:cxn ang="0">
+                <a:pos x="connsiteX28" y="connsiteY28"/>
+              </a:cxn>
+              <a:cxn ang="0">
+                <a:pos x="connsiteX29" y="connsiteY29"/>
+              </a:cxn>
+              <a:cxn ang="0">
+                <a:pos x="connsiteX30" y="connsiteY30"/>
+              </a:cxn>
+              <a:cxn ang="0">
+                <a:pos x="connsiteX31" y="connsiteY31"/>
+              </a:cxn>
+              <a:cxn ang="0">
+                <a:pos x="connsiteX32" y="connsiteY32"/>
+              </a:cxn>
+              <a:cxn ang="0">
+                <a:pos x="connsiteX33" y="connsiteY33"/>
+              </a:cxn>
+              <a:cxn ang="0">
+                <a:pos x="connsiteX34" y="connsiteY34"/>
+              </a:cxn>
+              <a:cxn ang="0">
+                <a:pos x="connsiteX35" y="connsiteY35"/>
+              </a:cxn>
+            </a:cxnLst>
+            <a:rect l="l" t="t" r="r" b="b"/>
+            <a:pathLst>
+              <a:path w="10853928" h="18288" fill="none" extrusionOk="0">
+                <a:moveTo>
+                  <a:pt x="0" y="0"/>
+                </a:moveTo>
+                <a:cubicBezTo>
+                  <a:pt x="146993" y="-19076"/>
+                  <a:pt x="347684" y="-4790"/>
+                  <a:pt x="461292" y="0"/>
+                </a:cubicBezTo>
+                <a:cubicBezTo>
+                  <a:pt x="574900" y="4790"/>
+                  <a:pt x="808367" y="19821"/>
+                  <a:pt x="1139662" y="0"/>
+                </a:cubicBezTo>
+                <a:cubicBezTo>
+                  <a:pt x="1470957" y="-19821"/>
+                  <a:pt x="1627405" y="5721"/>
+                  <a:pt x="1926572" y="0"/>
+                </a:cubicBezTo>
+                <a:cubicBezTo>
+                  <a:pt x="2225739" y="-5721"/>
+                  <a:pt x="2137730" y="-3235"/>
+                  <a:pt x="2279325" y="0"/>
+                </a:cubicBezTo>
+                <a:cubicBezTo>
+                  <a:pt x="2420920" y="3235"/>
+                  <a:pt x="2456518" y="9685"/>
+                  <a:pt x="2632078" y="0"/>
+                </a:cubicBezTo>
+                <a:cubicBezTo>
+                  <a:pt x="2807638" y="-9685"/>
+                  <a:pt x="3211516" y="-43007"/>
+                  <a:pt x="3527527" y="0"/>
+                </a:cubicBezTo>
+                <a:cubicBezTo>
+                  <a:pt x="3843538" y="43007"/>
+                  <a:pt x="4058833" y="22042"/>
+                  <a:pt x="4205897" y="0"/>
+                </a:cubicBezTo>
+                <a:cubicBezTo>
+                  <a:pt x="4352961" y="-22042"/>
+                  <a:pt x="4474805" y="-11846"/>
+                  <a:pt x="4558650" y="0"/>
+                </a:cubicBezTo>
+                <a:cubicBezTo>
+                  <a:pt x="4642495" y="11846"/>
+                  <a:pt x="5041928" y="-6069"/>
+                  <a:pt x="5237020" y="0"/>
+                </a:cubicBezTo>
+                <a:cubicBezTo>
+                  <a:pt x="5432112" y="6069"/>
+                  <a:pt x="5943266" y="-17479"/>
+                  <a:pt x="6132469" y="0"/>
+                </a:cubicBezTo>
+                <a:cubicBezTo>
+                  <a:pt x="6321672" y="17479"/>
+                  <a:pt x="6483872" y="26234"/>
+                  <a:pt x="6702301" y="0"/>
+                </a:cubicBezTo>
+                <a:cubicBezTo>
+                  <a:pt x="6920730" y="-26234"/>
+                  <a:pt x="6991194" y="-15156"/>
+                  <a:pt x="7272132" y="0"/>
+                </a:cubicBezTo>
+                <a:cubicBezTo>
+                  <a:pt x="7553070" y="15156"/>
+                  <a:pt x="7684444" y="-32961"/>
+                  <a:pt x="7950502" y="0"/>
+                </a:cubicBezTo>
+                <a:cubicBezTo>
+                  <a:pt x="8216560" y="32961"/>
+                  <a:pt x="8493290" y="-10491"/>
+                  <a:pt x="8737412" y="0"/>
+                </a:cubicBezTo>
+                <a:cubicBezTo>
+                  <a:pt x="8981534" y="10491"/>
+                  <a:pt x="9191586" y="-13899"/>
+                  <a:pt x="9524322" y="0"/>
+                </a:cubicBezTo>
+                <a:cubicBezTo>
+                  <a:pt x="9857058" y="13899"/>
+                  <a:pt x="10297509" y="7485"/>
+                  <a:pt x="10853928" y="0"/>
+                </a:cubicBezTo>
+                <a:cubicBezTo>
+                  <a:pt x="10854574" y="4451"/>
+                  <a:pt x="10854418" y="9226"/>
+                  <a:pt x="10853928" y="18288"/>
+                </a:cubicBezTo>
+                <a:cubicBezTo>
+                  <a:pt x="10691638" y="28522"/>
+                  <a:pt x="10574319" y="29578"/>
+                  <a:pt x="10392636" y="18288"/>
+                </a:cubicBezTo>
+                <a:cubicBezTo>
+                  <a:pt x="10210953" y="6998"/>
+                  <a:pt x="9836277" y="-16742"/>
+                  <a:pt x="9497187" y="18288"/>
+                </a:cubicBezTo>
+                <a:cubicBezTo>
+                  <a:pt x="9158097" y="53318"/>
+                  <a:pt x="9119479" y="30714"/>
+                  <a:pt x="8818817" y="18288"/>
+                </a:cubicBezTo>
+                <a:cubicBezTo>
+                  <a:pt x="8518155" y="5863"/>
+                  <a:pt x="8640037" y="6483"/>
+                  <a:pt x="8466064" y="18288"/>
+                </a:cubicBezTo>
+                <a:cubicBezTo>
+                  <a:pt x="8292091" y="30093"/>
+                  <a:pt x="7997656" y="18914"/>
+                  <a:pt x="7787693" y="18288"/>
+                </a:cubicBezTo>
+                <a:cubicBezTo>
+                  <a:pt x="7577730" y="17662"/>
+                  <a:pt x="7412468" y="21416"/>
+                  <a:pt x="7217862" y="18288"/>
+                </a:cubicBezTo>
+                <a:cubicBezTo>
+                  <a:pt x="7023256" y="15160"/>
+                  <a:pt x="6898018" y="14824"/>
+                  <a:pt x="6648031" y="18288"/>
+                </a:cubicBezTo>
+                <a:cubicBezTo>
+                  <a:pt x="6398044" y="21752"/>
+                  <a:pt x="6254402" y="38625"/>
+                  <a:pt x="6078200" y="18288"/>
+                </a:cubicBezTo>
+                <a:cubicBezTo>
+                  <a:pt x="5901998" y="-2049"/>
+                  <a:pt x="5622886" y="3213"/>
+                  <a:pt x="5508368" y="18288"/>
+                </a:cubicBezTo>
+                <a:cubicBezTo>
+                  <a:pt x="5393850" y="33363"/>
+                  <a:pt x="5036260" y="26830"/>
+                  <a:pt x="4721459" y="18288"/>
+                </a:cubicBezTo>
+                <a:cubicBezTo>
+                  <a:pt x="4406658" y="9746"/>
+                  <a:pt x="4239221" y="41551"/>
+                  <a:pt x="4043088" y="18288"/>
+                </a:cubicBezTo>
+                <a:cubicBezTo>
+                  <a:pt x="3846955" y="-4975"/>
+                  <a:pt x="3818802" y="34658"/>
+                  <a:pt x="3690336" y="18288"/>
+                </a:cubicBezTo>
+                <a:cubicBezTo>
+                  <a:pt x="3561870" y="1918"/>
+                  <a:pt x="3265491" y="42194"/>
+                  <a:pt x="3120504" y="18288"/>
+                </a:cubicBezTo>
+                <a:cubicBezTo>
+                  <a:pt x="2975517" y="-5618"/>
+                  <a:pt x="2720254" y="36673"/>
+                  <a:pt x="2333595" y="18288"/>
+                </a:cubicBezTo>
+                <a:cubicBezTo>
+                  <a:pt x="1946936" y="-97"/>
+                  <a:pt x="2097241" y="5776"/>
+                  <a:pt x="1872303" y="18288"/>
+                </a:cubicBezTo>
+                <a:cubicBezTo>
+                  <a:pt x="1647365" y="30800"/>
+                  <a:pt x="1282708" y="45380"/>
+                  <a:pt x="976854" y="18288"/>
+                </a:cubicBezTo>
+                <a:cubicBezTo>
+                  <a:pt x="671000" y="-8804"/>
+                  <a:pt x="408401" y="-12775"/>
+                  <a:pt x="0" y="18288"/>
+                </a:cubicBezTo>
+                <a:cubicBezTo>
+                  <a:pt x="-213" y="9468"/>
+                  <a:pt x="187" y="4459"/>
+                  <a:pt x="0" y="0"/>
+                </a:cubicBezTo>
+                <a:close/>
+              </a:path>
+              <a:path w="10853928" h="18288" stroke="0" extrusionOk="0">
+                <a:moveTo>
+                  <a:pt x="0" y="0"/>
+                </a:moveTo>
+                <a:cubicBezTo>
+                  <a:pt x="267322" y="15284"/>
+                  <a:pt x="415388" y="-21048"/>
+                  <a:pt x="569831" y="0"/>
+                </a:cubicBezTo>
+                <a:cubicBezTo>
+                  <a:pt x="724274" y="21048"/>
+                  <a:pt x="769333" y="-2353"/>
+                  <a:pt x="922584" y="0"/>
+                </a:cubicBezTo>
+                <a:cubicBezTo>
+                  <a:pt x="1075835" y="2353"/>
+                  <a:pt x="1399490" y="-145"/>
+                  <a:pt x="1818033" y="0"/>
+                </a:cubicBezTo>
+                <a:cubicBezTo>
+                  <a:pt x="2236576" y="145"/>
+                  <a:pt x="2145330" y="5482"/>
+                  <a:pt x="2387864" y="0"/>
+                </a:cubicBezTo>
+                <a:cubicBezTo>
+                  <a:pt x="2630398" y="-5482"/>
+                  <a:pt x="2793207" y="18487"/>
+                  <a:pt x="2957695" y="0"/>
+                </a:cubicBezTo>
+                <a:cubicBezTo>
+                  <a:pt x="3122183" y="-18487"/>
+                  <a:pt x="3579141" y="19003"/>
+                  <a:pt x="3853144" y="0"/>
+                </a:cubicBezTo>
+                <a:cubicBezTo>
+                  <a:pt x="4127147" y="-19003"/>
+                  <a:pt x="4209857" y="12211"/>
+                  <a:pt x="4314436" y="0"/>
+                </a:cubicBezTo>
+                <a:cubicBezTo>
+                  <a:pt x="4419015" y="-12211"/>
+                  <a:pt x="4762459" y="-17220"/>
+                  <a:pt x="5209885" y="0"/>
+                </a:cubicBezTo>
+                <a:cubicBezTo>
+                  <a:pt x="5657311" y="17220"/>
+                  <a:pt x="5692663" y="-3290"/>
+                  <a:pt x="6105335" y="0"/>
+                </a:cubicBezTo>
+                <a:cubicBezTo>
+                  <a:pt x="6518007" y="3290"/>
+                  <a:pt x="6455516" y="-5124"/>
+                  <a:pt x="6783705" y="0"/>
+                </a:cubicBezTo>
+                <a:cubicBezTo>
+                  <a:pt x="7111894" y="5124"/>
+                  <a:pt x="7441941" y="-17829"/>
+                  <a:pt x="7679154" y="0"/>
+                </a:cubicBezTo>
+                <a:cubicBezTo>
+                  <a:pt x="7916367" y="17829"/>
+                  <a:pt x="8102967" y="-24363"/>
+                  <a:pt x="8248985" y="0"/>
+                </a:cubicBezTo>
+                <a:cubicBezTo>
+                  <a:pt x="8395003" y="24363"/>
+                  <a:pt x="8552393" y="25505"/>
+                  <a:pt x="8818817" y="0"/>
+                </a:cubicBezTo>
+                <a:cubicBezTo>
+                  <a:pt x="9085241" y="-25505"/>
+                  <a:pt x="9411308" y="38000"/>
+                  <a:pt x="9605726" y="0"/>
+                </a:cubicBezTo>
+                <a:cubicBezTo>
+                  <a:pt x="9800144" y="-38000"/>
+                  <a:pt x="10006468" y="-25741"/>
+                  <a:pt x="10175558" y="0"/>
+                </a:cubicBezTo>
+                <a:cubicBezTo>
+                  <a:pt x="10344648" y="25741"/>
+                  <a:pt x="10696282" y="695"/>
+                  <a:pt x="10853928" y="0"/>
+                </a:cubicBezTo>
+                <a:cubicBezTo>
+                  <a:pt x="10853521" y="8690"/>
+                  <a:pt x="10853774" y="14141"/>
+                  <a:pt x="10853928" y="18288"/>
+                </a:cubicBezTo>
+                <a:cubicBezTo>
+                  <a:pt x="10608124" y="24255"/>
+                  <a:pt x="10343415" y="22307"/>
+                  <a:pt x="10067018" y="18288"/>
+                </a:cubicBezTo>
+                <a:cubicBezTo>
+                  <a:pt x="9790621" y="14270"/>
+                  <a:pt x="9843266" y="3564"/>
+                  <a:pt x="9714266" y="18288"/>
+                </a:cubicBezTo>
+                <a:cubicBezTo>
+                  <a:pt x="9585266" y="33012"/>
+                  <a:pt x="9379484" y="1875"/>
+                  <a:pt x="9252974" y="18288"/>
+                </a:cubicBezTo>
+                <a:cubicBezTo>
+                  <a:pt x="9126464" y="34701"/>
+                  <a:pt x="8580678" y="-4904"/>
+                  <a:pt x="8357525" y="18288"/>
+                </a:cubicBezTo>
+                <a:cubicBezTo>
+                  <a:pt x="8134372" y="41480"/>
+                  <a:pt x="7903199" y="26458"/>
+                  <a:pt x="7679154" y="18288"/>
+                </a:cubicBezTo>
+                <a:cubicBezTo>
+                  <a:pt x="7455109" y="10118"/>
+                  <a:pt x="7435944" y="27109"/>
+                  <a:pt x="7217862" y="18288"/>
+                </a:cubicBezTo>
+                <a:cubicBezTo>
+                  <a:pt x="6999780" y="9467"/>
+                  <a:pt x="6680409" y="18985"/>
+                  <a:pt x="6539492" y="18288"/>
+                </a:cubicBezTo>
+                <a:cubicBezTo>
+                  <a:pt x="6398575" y="17592"/>
+                  <a:pt x="6312077" y="33018"/>
+                  <a:pt x="6186739" y="18288"/>
+                </a:cubicBezTo>
+                <a:cubicBezTo>
+                  <a:pt x="6061401" y="3558"/>
+                  <a:pt x="5947033" y="12075"/>
+                  <a:pt x="5833986" y="18288"/>
+                </a:cubicBezTo>
+                <a:cubicBezTo>
+                  <a:pt x="5720939" y="24501"/>
+                  <a:pt x="5482226" y="8586"/>
+                  <a:pt x="5155616" y="18288"/>
+                </a:cubicBezTo>
+                <a:cubicBezTo>
+                  <a:pt x="4829006" y="27991"/>
+                  <a:pt x="4841274" y="29316"/>
+                  <a:pt x="4694324" y="18288"/>
+                </a:cubicBezTo>
+                <a:cubicBezTo>
+                  <a:pt x="4547374" y="7260"/>
+                  <a:pt x="4077675" y="7013"/>
+                  <a:pt x="3907414" y="18288"/>
+                </a:cubicBezTo>
+                <a:cubicBezTo>
+                  <a:pt x="3737153" y="29564"/>
+                  <a:pt x="3538393" y="21630"/>
+                  <a:pt x="3446122" y="18288"/>
+                </a:cubicBezTo>
+                <a:cubicBezTo>
+                  <a:pt x="3353851" y="14946"/>
+                  <a:pt x="2990320" y="-8091"/>
+                  <a:pt x="2659212" y="18288"/>
+                </a:cubicBezTo>
+                <a:cubicBezTo>
+                  <a:pt x="2328104" y="44667"/>
+                  <a:pt x="2427653" y="9607"/>
+                  <a:pt x="2306460" y="18288"/>
+                </a:cubicBezTo>
+                <a:cubicBezTo>
+                  <a:pt x="2185267" y="26969"/>
+                  <a:pt x="1719763" y="3717"/>
+                  <a:pt x="1519550" y="18288"/>
+                </a:cubicBezTo>
+                <a:cubicBezTo>
+                  <a:pt x="1319337" y="32860"/>
+                  <a:pt x="1167371" y="17040"/>
+                  <a:pt x="1058258" y="18288"/>
+                </a:cubicBezTo>
+                <a:cubicBezTo>
+                  <a:pt x="949145" y="19536"/>
+                  <a:pt x="780234" y="31447"/>
+                  <a:pt x="705505" y="18288"/>
+                </a:cubicBezTo>
+                <a:cubicBezTo>
+                  <a:pt x="630776" y="5129"/>
+                  <a:pt x="215796" y="30056"/>
+                  <a:pt x="0" y="18288"/>
+                </a:cubicBezTo>
+                <a:cubicBezTo>
+                  <a:pt x="-53" y="11301"/>
+                  <a:pt x="-649" y="7756"/>
+                  <a:pt x="0" y="0"/>
+                </a:cubicBezTo>
+                <a:close/>
+              </a:path>
+            </a:pathLst>
+          </a:custGeom>
+          <a:solidFill>
+            <a:schemeClr val="accent2"/>
+          </a:solidFill>
+          <a:ln w="41275" cap="rnd">
+            <a:solidFill>
+              <a:schemeClr val="accent2"/>
+            </a:solidFill>
+            <a:round/>
+            <a:extLst>
+              <a:ext uri="{C807C97D-BFC1-408E-A445-0C87EB9F89A2}">
+                <ask:lineSketchStyleProps xmlns:ask="http://schemas.microsoft.com/office/drawing/2018/sketchyshapes" sd="1219033472">
+                  <a:prstGeom prst="rect">
+                    <a:avLst/>
+                  </a:prstGeom>
+                  <ask:type>
+                    <ask:lineSketchFreehand/>
+                  </ask:type>
+                </ask:lineSketchStyleProps>
+              </a:ext>
+            </a:extLst>
+          </a:ln>
+        </p:spPr>
+        <p:style>
+          <a:lnRef idx="2">
+            <a:schemeClr val="accent1">
+              <a:shade val="50000"/>
+            </a:schemeClr>
+          </a:lnRef>
+          <a:fillRef idx="1">
+            <a:schemeClr val="accent1"/>
+          </a:fillRef>
+          <a:effectRef idx="0">
+            <a:schemeClr val="accent1"/>
+          </a:effectRef>
+          <a:fontRef idx="minor">
+            <a:schemeClr val="lt1"/>
+          </a:fontRef>
+        </p:style>
+        <p:txBody>
+          <a:bodyPr rtlCol="0" anchor="ctr"/>
+          <a:lstStyle/>
+          <a:p>
+            <a:pPr algn="ctr"/>
+            <a:endParaRPr lang="en-US"/>
           </a:p>
         </p:txBody>
       </p:sp>
@@ -4585,25 +5307,28 @@
             <p:ph idx="1"/>
           </p:nvPr>
         </p:nvSpPr>
-        <p:spPr/>
-        <p:txBody>
-          <a:bodyPr/>
+        <p:spPr>
+          <a:xfrm>
+            <a:off x="838200" y="1929384"/>
+            <a:ext cx="10515600" cy="4251960"/>
+          </a:xfrm>
+        </p:spPr>
+        <p:txBody>
+          <a:bodyPr>
+            <a:normAutofit/>
+          </a:bodyPr>
           <a:lstStyle/>
           <a:p>
-            <a:pPr marL="0" indent="0">
-              <a:buNone/>
+            <a:pPr marL="514350" indent="-514350">
+              <a:buAutoNum type="arabicPeriod"/>
             </a:pPr>
             <a:r>
-              <a:rPr lang="nl-NL" dirty="0"/>
-              <a:t>1. </a:t>
-            </a:r>
-            <a:r>
-              <a:rPr lang="nl-NL" dirty="0" err="1"/>
+              <a:rPr lang="nl-NL" sz="2200" dirty="0" err="1"/>
               <a:t>application</a:t>
             </a:r>
             <a:r>
-              <a:rPr lang="nl-NL" dirty="0"/>
-              <a:t> </a:t>
+              <a:rPr lang="nl-NL" sz="2200" dirty="0"/>
+              <a:t> 							</a:t>
             </a:r>
           </a:p>
           <a:p>
@@ -4612,7 +5337,7 @@
               <a:buAutoNum type="romanUcPeriod"/>
             </a:pPr>
             <a:r>
-              <a:rPr lang="nl-NL" dirty="0"/>
+              <a:rPr lang="nl-NL" sz="2200" dirty="0"/>
               <a:t>Design</a:t>
             </a:r>
           </a:p>
@@ -4622,8 +5347,8 @@
               <a:buAutoNum type="romanUcPeriod"/>
             </a:pPr>
             <a:r>
-              <a:rPr lang="nl-NL" dirty="0"/>
-              <a:t>Timer, gps, route</a:t>
+              <a:rPr lang="nl-NL" sz="2200" dirty="0"/>
+              <a:t>login</a:t>
             </a:r>
           </a:p>
           <a:p>
@@ -4632,16 +5357,8 @@
               <a:buAutoNum type="romanUcPeriod"/>
             </a:pPr>
             <a:r>
-              <a:rPr lang="nl-NL" dirty="0"/>
-              <a:t>User input </a:t>
-            </a:r>
-            <a:r>
-              <a:rPr lang="nl-NL" dirty="0" err="1"/>
-              <a:t>estimated</a:t>
-            </a:r>
-            <a:r>
-              <a:rPr lang="nl-NL" dirty="0"/>
-              <a:t> time</a:t>
+              <a:rPr lang="nl-NL" sz="2200" dirty="0"/>
+              <a:t>Timer, gps, route</a:t>
             </a:r>
           </a:p>
           <a:p>
@@ -4650,8 +5367,16 @@
               <a:buAutoNum type="romanUcPeriod"/>
             </a:pPr>
             <a:r>
-              <a:rPr lang="nl-NL" dirty="0"/>
-              <a:t>Speech feedback</a:t>
+              <a:rPr lang="nl-NL" sz="2200" dirty="0"/>
+              <a:t>User input </a:t>
+            </a:r>
+            <a:r>
+              <a:rPr lang="nl-NL" sz="2200" dirty="0" err="1"/>
+              <a:t>estimated</a:t>
+            </a:r>
+            <a:r>
+              <a:rPr lang="nl-NL" sz="2200" dirty="0"/>
+              <a:t> time</a:t>
             </a:r>
           </a:p>
           <a:p>
@@ -4660,37 +5385,65 @@
               <a:buAutoNum type="romanUcPeriod"/>
             </a:pPr>
             <a:r>
-              <a:rPr lang="nl-NL" dirty="0" err="1"/>
-              <a:t>Graphical</a:t>
-            </a:r>
-            <a:r>
-              <a:rPr lang="nl-NL" dirty="0"/>
-              <a:t> </a:t>
-            </a:r>
-            <a:r>
-              <a:rPr lang="nl-NL" dirty="0" err="1"/>
-              <a:t>overview</a:t>
-            </a:r>
-            <a:endParaRPr lang="nl-NL" dirty="0"/>
-          </a:p>
-          <a:p>
-            <a:pPr marL="457200" lvl="1" indent="0">
-              <a:buNone/>
-            </a:pPr>
-            <a:endParaRPr lang="nl-NL" dirty="0"/>
-          </a:p>
-          <a:p>
-            <a:pPr marL="457200" lvl="1" indent="0">
-              <a:buNone/>
-            </a:pPr>
-            <a:endParaRPr lang="nl-NL" dirty="0"/>
+              <a:rPr lang="nl-NL" sz="2200" dirty="0"/>
+              <a:t>Speech feedback</a:t>
+            </a:r>
           </a:p>
           <a:p>
             <a:pPr marL="971550" lvl="1" indent="-514350">
               <a:buFont typeface="+mj-lt"/>
               <a:buAutoNum type="romanUcPeriod"/>
             </a:pPr>
-            <a:endParaRPr lang="nl-BE" dirty="0"/>
+            <a:r>
+              <a:rPr lang="nl-NL" sz="2200" dirty="0"/>
+              <a:t>Link </a:t>
+            </a:r>
+            <a:r>
+              <a:rPr lang="nl-NL" sz="2200" dirty="0" err="1"/>
+              <a:t>to</a:t>
+            </a:r>
+            <a:r>
+              <a:rPr lang="nl-NL" sz="2200" dirty="0"/>
+              <a:t> server</a:t>
+            </a:r>
+          </a:p>
+          <a:p>
+            <a:pPr marL="971550" lvl="1" indent="-514350">
+              <a:buFont typeface="+mj-lt"/>
+              <a:buAutoNum type="romanUcPeriod"/>
+            </a:pPr>
+            <a:r>
+              <a:rPr lang="nl-NL" sz="2200" dirty="0" err="1"/>
+              <a:t>Graphical</a:t>
+            </a:r>
+            <a:r>
+              <a:rPr lang="nl-NL" sz="2200" dirty="0"/>
+              <a:t> </a:t>
+            </a:r>
+            <a:r>
+              <a:rPr lang="nl-NL" sz="2200" dirty="0" err="1"/>
+              <a:t>overview</a:t>
+            </a:r>
+            <a:endParaRPr lang="nl-NL" sz="2200" dirty="0"/>
+          </a:p>
+          <a:p>
+            <a:pPr marL="457200" lvl="1" indent="0">
+              <a:buNone/>
+            </a:pPr>
+            <a:endParaRPr lang="nl-NL" sz="2200" dirty="0"/>
+          </a:p>
+          <a:p>
+            <a:pPr marL="457200" lvl="1" indent="0">
+              <a:buNone/>
+            </a:pPr>
+            <a:endParaRPr lang="nl-NL" sz="2200" dirty="0"/>
+          </a:p>
+          <a:p>
+            <a:pPr marL="971550" lvl="1" indent="-514350">
+              <a:buFont typeface="+mj-lt"/>
+              <a:buAutoNum type="romanUcPeriod"/>
+            </a:pPr>
+            <a:endParaRPr lang="nl-BE" sz="2200" dirty="0"/>
           </a:p>
         </p:txBody>
       </p:sp>
@@ -4710,6 +5463,14 @@
 <file path=ppt/slides/slide4.xml><?xml version="1.0" encoding="utf-8"?>
 <p:sld xmlns:a="http://schemas.openxmlformats.org/drawingml/2006/main" xmlns:r="http://schemas.openxmlformats.org/officeDocument/2006/relationships" xmlns:p="http://schemas.openxmlformats.org/presentationml/2006/main">
   <p:cSld>
+    <p:bg>
+      <p:bgPr>
+        <a:solidFill>
+          <a:schemeClr val="bg1"/>
+        </a:solidFill>
+        <a:effectLst/>
+      </p:bgPr>
+    </p:bg>
     <p:spTree>
       <p:nvGrpSpPr>
         <p:cNvPr id="1" name=""/>
@@ -4724,6 +5485,66 @@
           <a:chExt cx="0" cy="0"/>
         </a:xfrm>
       </p:grpSpPr>
+      <p:sp useBgFill="1">
+        <p:nvSpPr>
+          <p:cNvPr id="8" name="Rectangle 7">
+            <a:extLst>
+              <a:ext uri="{FF2B5EF4-FFF2-40B4-BE49-F238E27FC236}">
+                <a16:creationId xmlns:a16="http://schemas.microsoft.com/office/drawing/2014/main" id="{100EDD19-6802-4EC3-95CE-CFFAB042CFD6}"/>
+              </a:ext>
+              <a:ext uri="{C183D7F6-B498-43B3-948B-1728B52AA6E4}">
+                <adec:decorative xmlns:adec="http://schemas.microsoft.com/office/drawing/2017/decorative" val="1"/>
+              </a:ext>
+            </a:extLst>
+          </p:cNvPr>
+          <p:cNvSpPr>
+            <a:spLocks noGrp="1" noRot="1" noChangeAspect="1" noMove="1" noResize="1" noEditPoints="1" noAdjustHandles="1" noChangeArrowheads="1" noChangeShapeType="1" noTextEdit="1"/>
+          </p:cNvSpPr>
+          <p:nvPr>
+            <p:extLst>
+              <p:ext uri="{386F3935-93C4-4BCD-93E2-E3B085C9AB24}">
+                <p16:designElem xmlns:p16="http://schemas.microsoft.com/office/powerpoint/2015/main" val="1"/>
+              </p:ext>
+            </p:extLst>
+          </p:nvPr>
+        </p:nvSpPr>
+        <p:spPr>
+          <a:xfrm>
+            <a:off x="0" y="0"/>
+            <a:ext cx="12188952" cy="6858000"/>
+          </a:xfrm>
+          <a:prstGeom prst="rect">
+            <a:avLst/>
+          </a:prstGeom>
+          <a:ln>
+            <a:noFill/>
+          </a:ln>
+        </p:spPr>
+        <p:style>
+          <a:lnRef idx="2">
+            <a:schemeClr val="accent1">
+              <a:shade val="50000"/>
+            </a:schemeClr>
+          </a:lnRef>
+          <a:fillRef idx="1">
+            <a:schemeClr val="accent1"/>
+          </a:fillRef>
+          <a:effectRef idx="0">
+            <a:schemeClr val="accent1"/>
+          </a:effectRef>
+          <a:fontRef idx="minor">
+            <a:schemeClr val="lt1"/>
+          </a:fontRef>
+        </p:style>
+        <p:txBody>
+          <a:bodyPr rtlCol="0" anchor="ctr"/>
+          <a:lstStyle/>
+          <a:p>
+            <a:pPr algn="ctr"/>
+            <a:endParaRPr lang="en-US"/>
+          </a:p>
+        </p:txBody>
+      </p:sp>
       <p:sp>
         <p:nvSpPr>
           <p:cNvPr id="2" name="Title 1">
@@ -4740,16 +5561,661 @@
             <p:ph type="title"/>
           </p:nvPr>
         </p:nvSpPr>
-        <p:spPr/>
-        <p:txBody>
-          <a:bodyPr/>
+        <p:spPr>
+          <a:xfrm>
+            <a:off x="838200" y="365125"/>
+            <a:ext cx="10515600" cy="1325563"/>
+          </a:xfrm>
+        </p:spPr>
+        <p:txBody>
+          <a:bodyPr>
+            <a:normAutofit/>
+          </a:bodyPr>
           <a:lstStyle/>
           <a:p>
             <a:r>
-              <a:rPr lang="nl-NL" dirty="0" err="1"/>
+              <a:rPr lang="nl-NL" sz="5400"/>
               <a:t>wbs</a:t>
             </a:r>
-            <a:endParaRPr lang="nl-BE" dirty="0"/>
+            <a:endParaRPr lang="nl-BE" sz="5400"/>
+          </a:p>
+        </p:txBody>
+      </p:sp>
+      <p:sp>
+        <p:nvSpPr>
+          <p:cNvPr id="10" name="sketch line">
+            <a:extLst>
+              <a:ext uri="{FF2B5EF4-FFF2-40B4-BE49-F238E27FC236}">
+                <a16:creationId xmlns:a16="http://schemas.microsoft.com/office/drawing/2014/main" id="{DB17E863-922E-4C26-BD64-E8FD41D28661}"/>
+              </a:ext>
+              <a:ext uri="{C183D7F6-B498-43B3-948B-1728B52AA6E4}">
+                <adec:decorative xmlns:adec="http://schemas.microsoft.com/office/drawing/2017/decorative" val="1"/>
+              </a:ext>
+            </a:extLst>
+          </p:cNvPr>
+          <p:cNvSpPr>
+            <a:spLocks noGrp="1" noRot="1" noChangeAspect="1" noMove="1" noResize="1" noEditPoints="1" noAdjustHandles="1" noChangeArrowheads="1" noChangeShapeType="1" noTextEdit="1"/>
+          </p:cNvSpPr>
+          <p:nvPr>
+            <p:extLst>
+              <p:ext uri="{386F3935-93C4-4BCD-93E2-E3B085C9AB24}">
+                <p16:designElem xmlns:p16="http://schemas.microsoft.com/office/powerpoint/2015/main" val="1"/>
+              </p:ext>
+            </p:extLst>
+          </p:nvPr>
+        </p:nvSpPr>
+        <p:spPr>
+          <a:xfrm>
+            <a:off x="669036" y="1677373"/>
+            <a:ext cx="10853928" cy="18288"/>
+          </a:xfrm>
+          <a:custGeom>
+            <a:avLst/>
+            <a:gdLst>
+              <a:gd name="connsiteX0" fmla="*/ 0 w 10853928"/>
+              <a:gd name="connsiteY0" fmla="*/ 0 h 18288"/>
+              <a:gd name="connsiteX1" fmla="*/ 461292 w 10853928"/>
+              <a:gd name="connsiteY1" fmla="*/ 0 h 18288"/>
+              <a:gd name="connsiteX2" fmla="*/ 1139662 w 10853928"/>
+              <a:gd name="connsiteY2" fmla="*/ 0 h 18288"/>
+              <a:gd name="connsiteX3" fmla="*/ 1926572 w 10853928"/>
+              <a:gd name="connsiteY3" fmla="*/ 0 h 18288"/>
+              <a:gd name="connsiteX4" fmla="*/ 2279325 w 10853928"/>
+              <a:gd name="connsiteY4" fmla="*/ 0 h 18288"/>
+              <a:gd name="connsiteX5" fmla="*/ 2632078 w 10853928"/>
+              <a:gd name="connsiteY5" fmla="*/ 0 h 18288"/>
+              <a:gd name="connsiteX6" fmla="*/ 3527527 w 10853928"/>
+              <a:gd name="connsiteY6" fmla="*/ 0 h 18288"/>
+              <a:gd name="connsiteX7" fmla="*/ 4205897 w 10853928"/>
+              <a:gd name="connsiteY7" fmla="*/ 0 h 18288"/>
+              <a:gd name="connsiteX8" fmla="*/ 4558650 w 10853928"/>
+              <a:gd name="connsiteY8" fmla="*/ 0 h 18288"/>
+              <a:gd name="connsiteX9" fmla="*/ 5237020 w 10853928"/>
+              <a:gd name="connsiteY9" fmla="*/ 0 h 18288"/>
+              <a:gd name="connsiteX10" fmla="*/ 6132469 w 10853928"/>
+              <a:gd name="connsiteY10" fmla="*/ 0 h 18288"/>
+              <a:gd name="connsiteX11" fmla="*/ 6702301 w 10853928"/>
+              <a:gd name="connsiteY11" fmla="*/ 0 h 18288"/>
+              <a:gd name="connsiteX12" fmla="*/ 7272132 w 10853928"/>
+              <a:gd name="connsiteY12" fmla="*/ 0 h 18288"/>
+              <a:gd name="connsiteX13" fmla="*/ 7950502 w 10853928"/>
+              <a:gd name="connsiteY13" fmla="*/ 0 h 18288"/>
+              <a:gd name="connsiteX14" fmla="*/ 8737412 w 10853928"/>
+              <a:gd name="connsiteY14" fmla="*/ 0 h 18288"/>
+              <a:gd name="connsiteX15" fmla="*/ 9524322 w 10853928"/>
+              <a:gd name="connsiteY15" fmla="*/ 0 h 18288"/>
+              <a:gd name="connsiteX16" fmla="*/ 10853928 w 10853928"/>
+              <a:gd name="connsiteY16" fmla="*/ 0 h 18288"/>
+              <a:gd name="connsiteX17" fmla="*/ 10853928 w 10853928"/>
+              <a:gd name="connsiteY17" fmla="*/ 18288 h 18288"/>
+              <a:gd name="connsiteX18" fmla="*/ 10392636 w 10853928"/>
+              <a:gd name="connsiteY18" fmla="*/ 18288 h 18288"/>
+              <a:gd name="connsiteX19" fmla="*/ 9497187 w 10853928"/>
+              <a:gd name="connsiteY19" fmla="*/ 18288 h 18288"/>
+              <a:gd name="connsiteX20" fmla="*/ 8818817 w 10853928"/>
+              <a:gd name="connsiteY20" fmla="*/ 18288 h 18288"/>
+              <a:gd name="connsiteX21" fmla="*/ 8466064 w 10853928"/>
+              <a:gd name="connsiteY21" fmla="*/ 18288 h 18288"/>
+              <a:gd name="connsiteX22" fmla="*/ 7787693 w 10853928"/>
+              <a:gd name="connsiteY22" fmla="*/ 18288 h 18288"/>
+              <a:gd name="connsiteX23" fmla="*/ 7217862 w 10853928"/>
+              <a:gd name="connsiteY23" fmla="*/ 18288 h 18288"/>
+              <a:gd name="connsiteX24" fmla="*/ 6648031 w 10853928"/>
+              <a:gd name="connsiteY24" fmla="*/ 18288 h 18288"/>
+              <a:gd name="connsiteX25" fmla="*/ 6078200 w 10853928"/>
+              <a:gd name="connsiteY25" fmla="*/ 18288 h 18288"/>
+              <a:gd name="connsiteX26" fmla="*/ 5508368 w 10853928"/>
+              <a:gd name="connsiteY26" fmla="*/ 18288 h 18288"/>
+              <a:gd name="connsiteX27" fmla="*/ 4721459 w 10853928"/>
+              <a:gd name="connsiteY27" fmla="*/ 18288 h 18288"/>
+              <a:gd name="connsiteX28" fmla="*/ 4043088 w 10853928"/>
+              <a:gd name="connsiteY28" fmla="*/ 18288 h 18288"/>
+              <a:gd name="connsiteX29" fmla="*/ 3690336 w 10853928"/>
+              <a:gd name="connsiteY29" fmla="*/ 18288 h 18288"/>
+              <a:gd name="connsiteX30" fmla="*/ 3120504 w 10853928"/>
+              <a:gd name="connsiteY30" fmla="*/ 18288 h 18288"/>
+              <a:gd name="connsiteX31" fmla="*/ 2333595 w 10853928"/>
+              <a:gd name="connsiteY31" fmla="*/ 18288 h 18288"/>
+              <a:gd name="connsiteX32" fmla="*/ 1872303 w 10853928"/>
+              <a:gd name="connsiteY32" fmla="*/ 18288 h 18288"/>
+              <a:gd name="connsiteX33" fmla="*/ 976854 w 10853928"/>
+              <a:gd name="connsiteY33" fmla="*/ 18288 h 18288"/>
+              <a:gd name="connsiteX34" fmla="*/ 0 w 10853928"/>
+              <a:gd name="connsiteY34" fmla="*/ 18288 h 18288"/>
+              <a:gd name="connsiteX35" fmla="*/ 0 w 10853928"/>
+              <a:gd name="connsiteY35" fmla="*/ 0 h 18288"/>
+            </a:gdLst>
+            <a:ahLst/>
+            <a:cxnLst>
+              <a:cxn ang="0">
+                <a:pos x="connsiteX0" y="connsiteY0"/>
+              </a:cxn>
+              <a:cxn ang="0">
+                <a:pos x="connsiteX1" y="connsiteY1"/>
+              </a:cxn>
+              <a:cxn ang="0">
+                <a:pos x="connsiteX2" y="connsiteY2"/>
+              </a:cxn>
+              <a:cxn ang="0">
+                <a:pos x="connsiteX3" y="connsiteY3"/>
+              </a:cxn>
+              <a:cxn ang="0">
+                <a:pos x="connsiteX4" y="connsiteY4"/>
+              </a:cxn>
+              <a:cxn ang="0">
+                <a:pos x="connsiteX5" y="connsiteY5"/>
+              </a:cxn>
+              <a:cxn ang="0">
+                <a:pos x="connsiteX6" y="connsiteY6"/>
+              </a:cxn>
+              <a:cxn ang="0">
+                <a:pos x="connsiteX7" y="connsiteY7"/>
+              </a:cxn>
+              <a:cxn ang="0">
+                <a:pos x="connsiteX8" y="connsiteY8"/>
+              </a:cxn>
+              <a:cxn ang="0">
+                <a:pos x="connsiteX9" y="connsiteY9"/>
+              </a:cxn>
+              <a:cxn ang="0">
+                <a:pos x="connsiteX10" y="connsiteY10"/>
+              </a:cxn>
+              <a:cxn ang="0">
+                <a:pos x="connsiteX11" y="connsiteY11"/>
+              </a:cxn>
+              <a:cxn ang="0">
+                <a:pos x="connsiteX12" y="connsiteY12"/>
+              </a:cxn>
+              <a:cxn ang="0">
+                <a:pos x="connsiteX13" y="connsiteY13"/>
+              </a:cxn>
+              <a:cxn ang="0">
+                <a:pos x="connsiteX14" y="connsiteY14"/>
+              </a:cxn>
+              <a:cxn ang="0">
+                <a:pos x="connsiteX15" y="connsiteY15"/>
+              </a:cxn>
+              <a:cxn ang="0">
+                <a:pos x="connsiteX16" y="connsiteY16"/>
+              </a:cxn>
+              <a:cxn ang="0">
+                <a:pos x="connsiteX17" y="connsiteY17"/>
+              </a:cxn>
+              <a:cxn ang="0">
+                <a:pos x="connsiteX18" y="connsiteY18"/>
+              </a:cxn>
+              <a:cxn ang="0">
+                <a:pos x="connsiteX19" y="connsiteY19"/>
+              </a:cxn>
+              <a:cxn ang="0">
+                <a:pos x="connsiteX20" y="connsiteY20"/>
+              </a:cxn>
+              <a:cxn ang="0">
+                <a:pos x="connsiteX21" y="connsiteY21"/>
+              </a:cxn>
+              <a:cxn ang="0">
+                <a:pos x="connsiteX22" y="connsiteY22"/>
+              </a:cxn>
+              <a:cxn ang="0">
+                <a:pos x="connsiteX23" y="connsiteY23"/>
+              </a:cxn>
+              <a:cxn ang="0">
+                <a:pos x="connsiteX24" y="connsiteY24"/>
+              </a:cxn>
+              <a:cxn ang="0">
+                <a:pos x="connsiteX25" y="connsiteY25"/>
+              </a:cxn>
+              <a:cxn ang="0">
+                <a:pos x="connsiteX26" y="connsiteY26"/>
+              </a:cxn>
+              <a:cxn ang="0">
+                <a:pos x="connsiteX27" y="connsiteY27"/>
+              </a:cxn>
+              <a:cxn ang="0">
+                <a:pos x="connsiteX28" y="connsiteY28"/>
+              </a:cxn>
+              <a:cxn ang="0">
+                <a:pos x="connsiteX29" y="connsiteY29"/>
+              </a:cxn>
+              <a:cxn ang="0">
+                <a:pos x="connsiteX30" y="connsiteY30"/>
+              </a:cxn>
+              <a:cxn ang="0">
+                <a:pos x="connsiteX31" y="connsiteY31"/>
+              </a:cxn>
+              <a:cxn ang="0">
+                <a:pos x="connsiteX32" y="connsiteY32"/>
+              </a:cxn>
+              <a:cxn ang="0">
+                <a:pos x="connsiteX33" y="connsiteY33"/>
+              </a:cxn>
+              <a:cxn ang="0">
+                <a:pos x="connsiteX34" y="connsiteY34"/>
+              </a:cxn>
+              <a:cxn ang="0">
+                <a:pos x="connsiteX35" y="connsiteY35"/>
+              </a:cxn>
+            </a:cxnLst>
+            <a:rect l="l" t="t" r="r" b="b"/>
+            <a:pathLst>
+              <a:path w="10853928" h="18288" fill="none" extrusionOk="0">
+                <a:moveTo>
+                  <a:pt x="0" y="0"/>
+                </a:moveTo>
+                <a:cubicBezTo>
+                  <a:pt x="146993" y="-19076"/>
+                  <a:pt x="347684" y="-4790"/>
+                  <a:pt x="461292" y="0"/>
+                </a:cubicBezTo>
+                <a:cubicBezTo>
+                  <a:pt x="574900" y="4790"/>
+                  <a:pt x="808367" y="19821"/>
+                  <a:pt x="1139662" y="0"/>
+                </a:cubicBezTo>
+                <a:cubicBezTo>
+                  <a:pt x="1470957" y="-19821"/>
+                  <a:pt x="1627405" y="5721"/>
+                  <a:pt x="1926572" y="0"/>
+                </a:cubicBezTo>
+                <a:cubicBezTo>
+                  <a:pt x="2225739" y="-5721"/>
+                  <a:pt x="2137730" y="-3235"/>
+                  <a:pt x="2279325" y="0"/>
+                </a:cubicBezTo>
+                <a:cubicBezTo>
+                  <a:pt x="2420920" y="3235"/>
+                  <a:pt x="2456518" y="9685"/>
+                  <a:pt x="2632078" y="0"/>
+                </a:cubicBezTo>
+                <a:cubicBezTo>
+                  <a:pt x="2807638" y="-9685"/>
+                  <a:pt x="3211516" y="-43007"/>
+                  <a:pt x="3527527" y="0"/>
+                </a:cubicBezTo>
+                <a:cubicBezTo>
+                  <a:pt x="3843538" y="43007"/>
+                  <a:pt x="4058833" y="22042"/>
+                  <a:pt x="4205897" y="0"/>
+                </a:cubicBezTo>
+                <a:cubicBezTo>
+                  <a:pt x="4352961" y="-22042"/>
+                  <a:pt x="4474805" y="-11846"/>
+                  <a:pt x="4558650" y="0"/>
+                </a:cubicBezTo>
+                <a:cubicBezTo>
+                  <a:pt x="4642495" y="11846"/>
+                  <a:pt x="5041928" y="-6069"/>
+                  <a:pt x="5237020" y="0"/>
+                </a:cubicBezTo>
+                <a:cubicBezTo>
+                  <a:pt x="5432112" y="6069"/>
+                  <a:pt x="5943266" y="-17479"/>
+                  <a:pt x="6132469" y="0"/>
+                </a:cubicBezTo>
+                <a:cubicBezTo>
+                  <a:pt x="6321672" y="17479"/>
+                  <a:pt x="6483872" y="26234"/>
+                  <a:pt x="6702301" y="0"/>
+                </a:cubicBezTo>
+                <a:cubicBezTo>
+                  <a:pt x="6920730" y="-26234"/>
+                  <a:pt x="6991194" y="-15156"/>
+                  <a:pt x="7272132" y="0"/>
+                </a:cubicBezTo>
+                <a:cubicBezTo>
+                  <a:pt x="7553070" y="15156"/>
+                  <a:pt x="7684444" y="-32961"/>
+                  <a:pt x="7950502" y="0"/>
+                </a:cubicBezTo>
+                <a:cubicBezTo>
+                  <a:pt x="8216560" y="32961"/>
+                  <a:pt x="8493290" y="-10491"/>
+                  <a:pt x="8737412" y="0"/>
+                </a:cubicBezTo>
+                <a:cubicBezTo>
+                  <a:pt x="8981534" y="10491"/>
+                  <a:pt x="9191586" y="-13899"/>
+                  <a:pt x="9524322" y="0"/>
+                </a:cubicBezTo>
+                <a:cubicBezTo>
+                  <a:pt x="9857058" y="13899"/>
+                  <a:pt x="10297509" y="7485"/>
+                  <a:pt x="10853928" y="0"/>
+                </a:cubicBezTo>
+                <a:cubicBezTo>
+                  <a:pt x="10854574" y="4451"/>
+                  <a:pt x="10854418" y="9226"/>
+                  <a:pt x="10853928" y="18288"/>
+                </a:cubicBezTo>
+                <a:cubicBezTo>
+                  <a:pt x="10691638" y="28522"/>
+                  <a:pt x="10574319" y="29578"/>
+                  <a:pt x="10392636" y="18288"/>
+                </a:cubicBezTo>
+                <a:cubicBezTo>
+                  <a:pt x="10210953" y="6998"/>
+                  <a:pt x="9836277" y="-16742"/>
+                  <a:pt x="9497187" y="18288"/>
+                </a:cubicBezTo>
+                <a:cubicBezTo>
+                  <a:pt x="9158097" y="53318"/>
+                  <a:pt x="9119479" y="30714"/>
+                  <a:pt x="8818817" y="18288"/>
+                </a:cubicBezTo>
+                <a:cubicBezTo>
+                  <a:pt x="8518155" y="5863"/>
+                  <a:pt x="8640037" y="6483"/>
+                  <a:pt x="8466064" y="18288"/>
+                </a:cubicBezTo>
+                <a:cubicBezTo>
+                  <a:pt x="8292091" y="30093"/>
+                  <a:pt x="7997656" y="18914"/>
+                  <a:pt x="7787693" y="18288"/>
+                </a:cubicBezTo>
+                <a:cubicBezTo>
+                  <a:pt x="7577730" y="17662"/>
+                  <a:pt x="7412468" y="21416"/>
+                  <a:pt x="7217862" y="18288"/>
+                </a:cubicBezTo>
+                <a:cubicBezTo>
+                  <a:pt x="7023256" y="15160"/>
+                  <a:pt x="6898018" y="14824"/>
+                  <a:pt x="6648031" y="18288"/>
+                </a:cubicBezTo>
+                <a:cubicBezTo>
+                  <a:pt x="6398044" y="21752"/>
+                  <a:pt x="6254402" y="38625"/>
+                  <a:pt x="6078200" y="18288"/>
+                </a:cubicBezTo>
+                <a:cubicBezTo>
+                  <a:pt x="5901998" y="-2049"/>
+                  <a:pt x="5622886" y="3213"/>
+                  <a:pt x="5508368" y="18288"/>
+                </a:cubicBezTo>
+                <a:cubicBezTo>
+                  <a:pt x="5393850" y="33363"/>
+                  <a:pt x="5036260" y="26830"/>
+                  <a:pt x="4721459" y="18288"/>
+                </a:cubicBezTo>
+                <a:cubicBezTo>
+                  <a:pt x="4406658" y="9746"/>
+                  <a:pt x="4239221" y="41551"/>
+                  <a:pt x="4043088" y="18288"/>
+                </a:cubicBezTo>
+                <a:cubicBezTo>
+                  <a:pt x="3846955" y="-4975"/>
+                  <a:pt x="3818802" y="34658"/>
+                  <a:pt x="3690336" y="18288"/>
+                </a:cubicBezTo>
+                <a:cubicBezTo>
+                  <a:pt x="3561870" y="1918"/>
+                  <a:pt x="3265491" y="42194"/>
+                  <a:pt x="3120504" y="18288"/>
+                </a:cubicBezTo>
+                <a:cubicBezTo>
+                  <a:pt x="2975517" y="-5618"/>
+                  <a:pt x="2720254" y="36673"/>
+                  <a:pt x="2333595" y="18288"/>
+                </a:cubicBezTo>
+                <a:cubicBezTo>
+                  <a:pt x="1946936" y="-97"/>
+                  <a:pt x="2097241" y="5776"/>
+                  <a:pt x="1872303" y="18288"/>
+                </a:cubicBezTo>
+                <a:cubicBezTo>
+                  <a:pt x="1647365" y="30800"/>
+                  <a:pt x="1282708" y="45380"/>
+                  <a:pt x="976854" y="18288"/>
+                </a:cubicBezTo>
+                <a:cubicBezTo>
+                  <a:pt x="671000" y="-8804"/>
+                  <a:pt x="408401" y="-12775"/>
+                  <a:pt x="0" y="18288"/>
+                </a:cubicBezTo>
+                <a:cubicBezTo>
+                  <a:pt x="-213" y="9468"/>
+                  <a:pt x="187" y="4459"/>
+                  <a:pt x="0" y="0"/>
+                </a:cubicBezTo>
+                <a:close/>
+              </a:path>
+              <a:path w="10853928" h="18288" stroke="0" extrusionOk="0">
+                <a:moveTo>
+                  <a:pt x="0" y="0"/>
+                </a:moveTo>
+                <a:cubicBezTo>
+                  <a:pt x="267322" y="15284"/>
+                  <a:pt x="415388" y="-21048"/>
+                  <a:pt x="569831" y="0"/>
+                </a:cubicBezTo>
+                <a:cubicBezTo>
+                  <a:pt x="724274" y="21048"/>
+                  <a:pt x="769333" y="-2353"/>
+                  <a:pt x="922584" y="0"/>
+                </a:cubicBezTo>
+                <a:cubicBezTo>
+                  <a:pt x="1075835" y="2353"/>
+                  <a:pt x="1399490" y="-145"/>
+                  <a:pt x="1818033" y="0"/>
+                </a:cubicBezTo>
+                <a:cubicBezTo>
+                  <a:pt x="2236576" y="145"/>
+                  <a:pt x="2145330" y="5482"/>
+                  <a:pt x="2387864" y="0"/>
+                </a:cubicBezTo>
+                <a:cubicBezTo>
+                  <a:pt x="2630398" y="-5482"/>
+                  <a:pt x="2793207" y="18487"/>
+                  <a:pt x="2957695" y="0"/>
+                </a:cubicBezTo>
+                <a:cubicBezTo>
+                  <a:pt x="3122183" y="-18487"/>
+                  <a:pt x="3579141" y="19003"/>
+                  <a:pt x="3853144" y="0"/>
+                </a:cubicBezTo>
+                <a:cubicBezTo>
+                  <a:pt x="4127147" y="-19003"/>
+                  <a:pt x="4209857" y="12211"/>
+                  <a:pt x="4314436" y="0"/>
+                </a:cubicBezTo>
+                <a:cubicBezTo>
+                  <a:pt x="4419015" y="-12211"/>
+                  <a:pt x="4762459" y="-17220"/>
+                  <a:pt x="5209885" y="0"/>
+                </a:cubicBezTo>
+                <a:cubicBezTo>
+                  <a:pt x="5657311" y="17220"/>
+                  <a:pt x="5692663" y="-3290"/>
+                  <a:pt x="6105335" y="0"/>
+                </a:cubicBezTo>
+                <a:cubicBezTo>
+                  <a:pt x="6518007" y="3290"/>
+                  <a:pt x="6455516" y="-5124"/>
+                  <a:pt x="6783705" y="0"/>
+                </a:cubicBezTo>
+                <a:cubicBezTo>
+                  <a:pt x="7111894" y="5124"/>
+                  <a:pt x="7441941" y="-17829"/>
+                  <a:pt x="7679154" y="0"/>
+                </a:cubicBezTo>
+                <a:cubicBezTo>
+                  <a:pt x="7916367" y="17829"/>
+                  <a:pt x="8102967" y="-24363"/>
+                  <a:pt x="8248985" y="0"/>
+                </a:cubicBezTo>
+                <a:cubicBezTo>
+                  <a:pt x="8395003" y="24363"/>
+                  <a:pt x="8552393" y="25505"/>
+                  <a:pt x="8818817" y="0"/>
+                </a:cubicBezTo>
+                <a:cubicBezTo>
+                  <a:pt x="9085241" y="-25505"/>
+                  <a:pt x="9411308" y="38000"/>
+                  <a:pt x="9605726" y="0"/>
+                </a:cubicBezTo>
+                <a:cubicBezTo>
+                  <a:pt x="9800144" y="-38000"/>
+                  <a:pt x="10006468" y="-25741"/>
+                  <a:pt x="10175558" y="0"/>
+                </a:cubicBezTo>
+                <a:cubicBezTo>
+                  <a:pt x="10344648" y="25741"/>
+                  <a:pt x="10696282" y="695"/>
+                  <a:pt x="10853928" y="0"/>
+                </a:cubicBezTo>
+                <a:cubicBezTo>
+                  <a:pt x="10853521" y="8690"/>
+                  <a:pt x="10853774" y="14141"/>
+                  <a:pt x="10853928" y="18288"/>
+                </a:cubicBezTo>
+                <a:cubicBezTo>
+                  <a:pt x="10608124" y="24255"/>
+                  <a:pt x="10343415" y="22307"/>
+                  <a:pt x="10067018" y="18288"/>
+                </a:cubicBezTo>
+                <a:cubicBezTo>
+                  <a:pt x="9790621" y="14270"/>
+                  <a:pt x="9843266" y="3564"/>
+                  <a:pt x="9714266" y="18288"/>
+                </a:cubicBezTo>
+                <a:cubicBezTo>
+                  <a:pt x="9585266" y="33012"/>
+                  <a:pt x="9379484" y="1875"/>
+                  <a:pt x="9252974" y="18288"/>
+                </a:cubicBezTo>
+                <a:cubicBezTo>
+                  <a:pt x="9126464" y="34701"/>
+                  <a:pt x="8580678" y="-4904"/>
+                  <a:pt x="8357525" y="18288"/>
+                </a:cubicBezTo>
+                <a:cubicBezTo>
+                  <a:pt x="8134372" y="41480"/>
+                  <a:pt x="7903199" y="26458"/>
+                  <a:pt x="7679154" y="18288"/>
+                </a:cubicBezTo>
+                <a:cubicBezTo>
+                  <a:pt x="7455109" y="10118"/>
+                  <a:pt x="7435944" y="27109"/>
+                  <a:pt x="7217862" y="18288"/>
+                </a:cubicBezTo>
+                <a:cubicBezTo>
+                  <a:pt x="6999780" y="9467"/>
+                  <a:pt x="6680409" y="18985"/>
+                  <a:pt x="6539492" y="18288"/>
+                </a:cubicBezTo>
+                <a:cubicBezTo>
+                  <a:pt x="6398575" y="17592"/>
+                  <a:pt x="6312077" y="33018"/>
+                  <a:pt x="6186739" y="18288"/>
+                </a:cubicBezTo>
+                <a:cubicBezTo>
+                  <a:pt x="6061401" y="3558"/>
+                  <a:pt x="5947033" y="12075"/>
+                  <a:pt x="5833986" y="18288"/>
+                </a:cubicBezTo>
+                <a:cubicBezTo>
+                  <a:pt x="5720939" y="24501"/>
+                  <a:pt x="5482226" y="8586"/>
+                  <a:pt x="5155616" y="18288"/>
+                </a:cubicBezTo>
+                <a:cubicBezTo>
+                  <a:pt x="4829006" y="27991"/>
+                  <a:pt x="4841274" y="29316"/>
+                  <a:pt x="4694324" y="18288"/>
+                </a:cubicBezTo>
+                <a:cubicBezTo>
+                  <a:pt x="4547374" y="7260"/>
+                  <a:pt x="4077675" y="7013"/>
+                  <a:pt x="3907414" y="18288"/>
+                </a:cubicBezTo>
+                <a:cubicBezTo>
+                  <a:pt x="3737153" y="29564"/>
+                  <a:pt x="3538393" y="21630"/>
+                  <a:pt x="3446122" y="18288"/>
+                </a:cubicBezTo>
+                <a:cubicBezTo>
+                  <a:pt x="3353851" y="14946"/>
+                  <a:pt x="2990320" y="-8091"/>
+                  <a:pt x="2659212" y="18288"/>
+                </a:cubicBezTo>
+                <a:cubicBezTo>
+                  <a:pt x="2328104" y="44667"/>
+                  <a:pt x="2427653" y="9607"/>
+                  <a:pt x="2306460" y="18288"/>
+                </a:cubicBezTo>
+                <a:cubicBezTo>
+                  <a:pt x="2185267" y="26969"/>
+                  <a:pt x="1719763" y="3717"/>
+                  <a:pt x="1519550" y="18288"/>
+                </a:cubicBezTo>
+                <a:cubicBezTo>
+                  <a:pt x="1319337" y="32860"/>
+                  <a:pt x="1167371" y="17040"/>
+                  <a:pt x="1058258" y="18288"/>
+                </a:cubicBezTo>
+                <a:cubicBezTo>
+                  <a:pt x="949145" y="19536"/>
+                  <a:pt x="780234" y="31447"/>
+                  <a:pt x="705505" y="18288"/>
+                </a:cubicBezTo>
+                <a:cubicBezTo>
+                  <a:pt x="630776" y="5129"/>
+                  <a:pt x="215796" y="30056"/>
+                  <a:pt x="0" y="18288"/>
+                </a:cubicBezTo>
+                <a:cubicBezTo>
+                  <a:pt x="-53" y="11301"/>
+                  <a:pt x="-649" y="7756"/>
+                  <a:pt x="0" y="0"/>
+                </a:cubicBezTo>
+                <a:close/>
+              </a:path>
+            </a:pathLst>
+          </a:custGeom>
+          <a:solidFill>
+            <a:schemeClr val="accent2"/>
+          </a:solidFill>
+          <a:ln w="41275" cap="rnd">
+            <a:solidFill>
+              <a:schemeClr val="accent2"/>
+            </a:solidFill>
+            <a:round/>
+            <a:extLst>
+              <a:ext uri="{C807C97D-BFC1-408E-A445-0C87EB9F89A2}">
+                <ask:lineSketchStyleProps xmlns:ask="http://schemas.microsoft.com/office/drawing/2018/sketchyshapes" sd="1219033472">
+                  <a:prstGeom prst="rect">
+                    <a:avLst/>
+                  </a:prstGeom>
+                  <ask:type>
+                    <ask:lineSketchFreehand/>
+                  </ask:type>
+                </ask:lineSketchStyleProps>
+              </a:ext>
+            </a:extLst>
+          </a:ln>
+        </p:spPr>
+        <p:style>
+          <a:lnRef idx="2">
+            <a:schemeClr val="accent1">
+              <a:shade val="50000"/>
+            </a:schemeClr>
+          </a:lnRef>
+          <a:fillRef idx="1">
+            <a:schemeClr val="accent1"/>
+          </a:fillRef>
+          <a:effectRef idx="0">
+            <a:schemeClr val="accent1"/>
+          </a:effectRef>
+          <a:fontRef idx="minor">
+            <a:schemeClr val="lt1"/>
+          </a:fontRef>
+        </p:style>
+        <p:txBody>
+          <a:bodyPr rtlCol="0" anchor="ctr"/>
+          <a:lstStyle/>
+          <a:p>
+            <a:pPr algn="ctr"/>
+            <a:endParaRPr lang="en-US"/>
           </a:p>
         </p:txBody>
       </p:sp>
@@ -4769,16 +6235,23 @@
             <p:ph idx="1"/>
           </p:nvPr>
         </p:nvSpPr>
-        <p:spPr/>
-        <p:txBody>
-          <a:bodyPr/>
+        <p:spPr>
+          <a:xfrm>
+            <a:off x="838200" y="1929384"/>
+            <a:ext cx="10515600" cy="4251960"/>
+          </a:xfrm>
+        </p:spPr>
+        <p:txBody>
+          <a:bodyPr>
+            <a:normAutofit/>
+          </a:bodyPr>
           <a:lstStyle/>
           <a:p>
             <a:pPr marL="457200" lvl="1" indent="0">
               <a:buNone/>
             </a:pPr>
             <a:r>
-              <a:rPr lang="nl-NL" dirty="0"/>
+              <a:rPr lang="nl-NL" sz="2200"/>
               <a:t>2. Website</a:t>
             </a:r>
           </a:p>
@@ -4788,7 +6261,7 @@
               <a:buAutoNum type="romanUcPeriod"/>
             </a:pPr>
             <a:r>
-              <a:rPr lang="nl-NL"/>
+              <a:rPr lang="nl-NL" sz="2200"/>
               <a:t>Design</a:t>
             </a:r>
           </a:p>
@@ -4797,14 +6270,49 @@
               <a:buFont typeface="+mj-lt"/>
               <a:buAutoNum type="romanUcPeriod"/>
             </a:pPr>
-            <a:endParaRPr lang="nl-NL" dirty="0"/>
+            <a:r>
+              <a:rPr lang="nl-NL" sz="2200"/>
+              <a:t>Log in</a:t>
+            </a:r>
+          </a:p>
+          <a:p>
+            <a:pPr marL="1428750" lvl="2" indent="-514350">
+              <a:buFont typeface="+mj-lt"/>
+              <a:buAutoNum type="romanUcPeriod"/>
+            </a:pPr>
+            <a:r>
+              <a:rPr lang="nl-NL" sz="2200"/>
+              <a:t>Link to server</a:t>
+            </a:r>
+          </a:p>
+          <a:p>
+            <a:pPr marL="1428750" lvl="2" indent="-514350">
+              <a:buFont typeface="+mj-lt"/>
+              <a:buAutoNum type="romanUcPeriod"/>
+            </a:pPr>
+            <a:r>
+              <a:rPr lang="nl-NL" sz="2200"/>
+              <a:t>Graphical </a:t>
+            </a:r>
+            <a:r>
+              <a:rPr lang="nl-BE" sz="2200"/>
+              <a:t>overview </a:t>
+            </a:r>
+            <a:endParaRPr lang="nl-NL" sz="2200"/>
+          </a:p>
+          <a:p>
+            <a:pPr marL="1428750" lvl="2" indent="-514350">
+              <a:buFont typeface="+mj-lt"/>
+              <a:buAutoNum type="romanUcPeriod"/>
+            </a:pPr>
+            <a:endParaRPr lang="nl-NL" sz="2200"/>
           </a:p>
           <a:p>
             <a:pPr marL="571500" indent="-571500">
               <a:buFont typeface="+mj-lt"/>
               <a:buAutoNum type="romanUcPeriod"/>
             </a:pPr>
-            <a:endParaRPr lang="nl-BE" dirty="0"/>
+            <a:endParaRPr lang="nl-BE" sz="2200"/>
           </a:p>
         </p:txBody>
       </p:sp>
@@ -4812,6 +6320,838 @@
     <p:extLst>
       <p:ext uri="{BB962C8B-B14F-4D97-AF65-F5344CB8AC3E}">
         <p14:creationId xmlns:p14="http://schemas.microsoft.com/office/powerpoint/2010/main" val="1828557644"/>
+      </p:ext>
+    </p:extLst>
+  </p:cSld>
+  <p:clrMapOvr>
+    <a:masterClrMapping/>
+  </p:clrMapOvr>
+</p:sld>
+</file>
+
+<file path=ppt/slides/slide5.xml><?xml version="1.0" encoding="utf-8"?>
+<p:sld xmlns:a="http://schemas.openxmlformats.org/drawingml/2006/main" xmlns:r="http://schemas.openxmlformats.org/officeDocument/2006/relationships" xmlns:p="http://schemas.openxmlformats.org/presentationml/2006/main">
+  <p:cSld>
+    <p:bg>
+      <p:bgPr>
+        <a:solidFill>
+          <a:schemeClr val="bg1"/>
+        </a:solidFill>
+        <a:effectLst/>
+      </p:bgPr>
+    </p:bg>
+    <p:spTree>
+      <p:nvGrpSpPr>
+        <p:cNvPr id="1" name=""/>
+        <p:cNvGrpSpPr/>
+        <p:nvPr/>
+      </p:nvGrpSpPr>
+      <p:grpSpPr>
+        <a:xfrm>
+          <a:off x="0" y="0"/>
+          <a:ext cx="0" cy="0"/>
+          <a:chOff x="0" y="0"/>
+          <a:chExt cx="0" cy="0"/>
+        </a:xfrm>
+      </p:grpSpPr>
+      <p:sp useBgFill="1">
+        <p:nvSpPr>
+          <p:cNvPr id="8" name="Rectangle 7">
+            <a:extLst>
+              <a:ext uri="{FF2B5EF4-FFF2-40B4-BE49-F238E27FC236}">
+                <a16:creationId xmlns:a16="http://schemas.microsoft.com/office/drawing/2014/main" id="{100EDD19-6802-4EC3-95CE-CFFAB042CFD6}"/>
+              </a:ext>
+              <a:ext uri="{C183D7F6-B498-43B3-948B-1728B52AA6E4}">
+                <adec:decorative xmlns:adec="http://schemas.microsoft.com/office/drawing/2017/decorative" val="1"/>
+              </a:ext>
+            </a:extLst>
+          </p:cNvPr>
+          <p:cNvSpPr>
+            <a:spLocks noGrp="1" noRot="1" noChangeAspect="1" noMove="1" noResize="1" noEditPoints="1" noAdjustHandles="1" noChangeArrowheads="1" noChangeShapeType="1" noTextEdit="1"/>
+          </p:cNvSpPr>
+          <p:nvPr>
+            <p:extLst>
+              <p:ext uri="{386F3935-93C4-4BCD-93E2-E3B085C9AB24}">
+                <p16:designElem xmlns:p16="http://schemas.microsoft.com/office/powerpoint/2015/main" val="1"/>
+              </p:ext>
+            </p:extLst>
+          </p:nvPr>
+        </p:nvSpPr>
+        <p:spPr>
+          <a:xfrm>
+            <a:off x="0" y="0"/>
+            <a:ext cx="12188952" cy="6858000"/>
+          </a:xfrm>
+          <a:prstGeom prst="rect">
+            <a:avLst/>
+          </a:prstGeom>
+          <a:ln>
+            <a:noFill/>
+          </a:ln>
+        </p:spPr>
+        <p:style>
+          <a:lnRef idx="2">
+            <a:schemeClr val="accent1">
+              <a:shade val="50000"/>
+            </a:schemeClr>
+          </a:lnRef>
+          <a:fillRef idx="1">
+            <a:schemeClr val="accent1"/>
+          </a:fillRef>
+          <a:effectRef idx="0">
+            <a:schemeClr val="accent1"/>
+          </a:effectRef>
+          <a:fontRef idx="minor">
+            <a:schemeClr val="lt1"/>
+          </a:fontRef>
+        </p:style>
+        <p:txBody>
+          <a:bodyPr rtlCol="0" anchor="ctr"/>
+          <a:lstStyle/>
+          <a:p>
+            <a:pPr algn="ctr"/>
+            <a:endParaRPr lang="en-US"/>
+          </a:p>
+        </p:txBody>
+      </p:sp>
+      <p:sp>
+        <p:nvSpPr>
+          <p:cNvPr id="2" name="Title 1">
+            <a:extLst>
+              <a:ext uri="{FF2B5EF4-FFF2-40B4-BE49-F238E27FC236}">
+                <a16:creationId xmlns:a16="http://schemas.microsoft.com/office/drawing/2014/main" id="{465B0B43-D7E8-413B-B62A-D114987E61C8}"/>
+              </a:ext>
+            </a:extLst>
+          </p:cNvPr>
+          <p:cNvSpPr>
+            <a:spLocks noGrp="1"/>
+          </p:cNvSpPr>
+          <p:nvPr>
+            <p:ph type="title"/>
+          </p:nvPr>
+        </p:nvSpPr>
+        <p:spPr>
+          <a:xfrm>
+            <a:off x="838200" y="365125"/>
+            <a:ext cx="10515600" cy="1325563"/>
+          </a:xfrm>
+        </p:spPr>
+        <p:txBody>
+          <a:bodyPr>
+            <a:normAutofit/>
+          </a:bodyPr>
+          <a:lstStyle/>
+          <a:p>
+            <a:r>
+              <a:rPr lang="nl-BE" sz="5400"/>
+              <a:t>wbs</a:t>
+            </a:r>
+          </a:p>
+        </p:txBody>
+      </p:sp>
+      <p:sp>
+        <p:nvSpPr>
+          <p:cNvPr id="10" name="sketch line">
+            <a:extLst>
+              <a:ext uri="{FF2B5EF4-FFF2-40B4-BE49-F238E27FC236}">
+                <a16:creationId xmlns:a16="http://schemas.microsoft.com/office/drawing/2014/main" id="{DB17E863-922E-4C26-BD64-E8FD41D28661}"/>
+              </a:ext>
+              <a:ext uri="{C183D7F6-B498-43B3-948B-1728B52AA6E4}">
+                <adec:decorative xmlns:adec="http://schemas.microsoft.com/office/drawing/2017/decorative" val="1"/>
+              </a:ext>
+            </a:extLst>
+          </p:cNvPr>
+          <p:cNvSpPr>
+            <a:spLocks noGrp="1" noRot="1" noChangeAspect="1" noMove="1" noResize="1" noEditPoints="1" noAdjustHandles="1" noChangeArrowheads="1" noChangeShapeType="1" noTextEdit="1"/>
+          </p:cNvSpPr>
+          <p:nvPr>
+            <p:extLst>
+              <p:ext uri="{386F3935-93C4-4BCD-93E2-E3B085C9AB24}">
+                <p16:designElem xmlns:p16="http://schemas.microsoft.com/office/powerpoint/2015/main" val="1"/>
+              </p:ext>
+            </p:extLst>
+          </p:nvPr>
+        </p:nvSpPr>
+        <p:spPr>
+          <a:xfrm>
+            <a:off x="669036" y="1677373"/>
+            <a:ext cx="10853928" cy="18288"/>
+          </a:xfrm>
+          <a:custGeom>
+            <a:avLst/>
+            <a:gdLst>
+              <a:gd name="connsiteX0" fmla="*/ 0 w 10853928"/>
+              <a:gd name="connsiteY0" fmla="*/ 0 h 18288"/>
+              <a:gd name="connsiteX1" fmla="*/ 461292 w 10853928"/>
+              <a:gd name="connsiteY1" fmla="*/ 0 h 18288"/>
+              <a:gd name="connsiteX2" fmla="*/ 1139662 w 10853928"/>
+              <a:gd name="connsiteY2" fmla="*/ 0 h 18288"/>
+              <a:gd name="connsiteX3" fmla="*/ 1926572 w 10853928"/>
+              <a:gd name="connsiteY3" fmla="*/ 0 h 18288"/>
+              <a:gd name="connsiteX4" fmla="*/ 2279325 w 10853928"/>
+              <a:gd name="connsiteY4" fmla="*/ 0 h 18288"/>
+              <a:gd name="connsiteX5" fmla="*/ 2632078 w 10853928"/>
+              <a:gd name="connsiteY5" fmla="*/ 0 h 18288"/>
+              <a:gd name="connsiteX6" fmla="*/ 3527527 w 10853928"/>
+              <a:gd name="connsiteY6" fmla="*/ 0 h 18288"/>
+              <a:gd name="connsiteX7" fmla="*/ 4205897 w 10853928"/>
+              <a:gd name="connsiteY7" fmla="*/ 0 h 18288"/>
+              <a:gd name="connsiteX8" fmla="*/ 4558650 w 10853928"/>
+              <a:gd name="connsiteY8" fmla="*/ 0 h 18288"/>
+              <a:gd name="connsiteX9" fmla="*/ 5237020 w 10853928"/>
+              <a:gd name="connsiteY9" fmla="*/ 0 h 18288"/>
+              <a:gd name="connsiteX10" fmla="*/ 6132469 w 10853928"/>
+              <a:gd name="connsiteY10" fmla="*/ 0 h 18288"/>
+              <a:gd name="connsiteX11" fmla="*/ 6702301 w 10853928"/>
+              <a:gd name="connsiteY11" fmla="*/ 0 h 18288"/>
+              <a:gd name="connsiteX12" fmla="*/ 7272132 w 10853928"/>
+              <a:gd name="connsiteY12" fmla="*/ 0 h 18288"/>
+              <a:gd name="connsiteX13" fmla="*/ 7950502 w 10853928"/>
+              <a:gd name="connsiteY13" fmla="*/ 0 h 18288"/>
+              <a:gd name="connsiteX14" fmla="*/ 8737412 w 10853928"/>
+              <a:gd name="connsiteY14" fmla="*/ 0 h 18288"/>
+              <a:gd name="connsiteX15" fmla="*/ 9524322 w 10853928"/>
+              <a:gd name="connsiteY15" fmla="*/ 0 h 18288"/>
+              <a:gd name="connsiteX16" fmla="*/ 10853928 w 10853928"/>
+              <a:gd name="connsiteY16" fmla="*/ 0 h 18288"/>
+              <a:gd name="connsiteX17" fmla="*/ 10853928 w 10853928"/>
+              <a:gd name="connsiteY17" fmla="*/ 18288 h 18288"/>
+              <a:gd name="connsiteX18" fmla="*/ 10392636 w 10853928"/>
+              <a:gd name="connsiteY18" fmla="*/ 18288 h 18288"/>
+              <a:gd name="connsiteX19" fmla="*/ 9497187 w 10853928"/>
+              <a:gd name="connsiteY19" fmla="*/ 18288 h 18288"/>
+              <a:gd name="connsiteX20" fmla="*/ 8818817 w 10853928"/>
+              <a:gd name="connsiteY20" fmla="*/ 18288 h 18288"/>
+              <a:gd name="connsiteX21" fmla="*/ 8466064 w 10853928"/>
+              <a:gd name="connsiteY21" fmla="*/ 18288 h 18288"/>
+              <a:gd name="connsiteX22" fmla="*/ 7787693 w 10853928"/>
+              <a:gd name="connsiteY22" fmla="*/ 18288 h 18288"/>
+              <a:gd name="connsiteX23" fmla="*/ 7217862 w 10853928"/>
+              <a:gd name="connsiteY23" fmla="*/ 18288 h 18288"/>
+              <a:gd name="connsiteX24" fmla="*/ 6648031 w 10853928"/>
+              <a:gd name="connsiteY24" fmla="*/ 18288 h 18288"/>
+              <a:gd name="connsiteX25" fmla="*/ 6078200 w 10853928"/>
+              <a:gd name="connsiteY25" fmla="*/ 18288 h 18288"/>
+              <a:gd name="connsiteX26" fmla="*/ 5508368 w 10853928"/>
+              <a:gd name="connsiteY26" fmla="*/ 18288 h 18288"/>
+              <a:gd name="connsiteX27" fmla="*/ 4721459 w 10853928"/>
+              <a:gd name="connsiteY27" fmla="*/ 18288 h 18288"/>
+              <a:gd name="connsiteX28" fmla="*/ 4043088 w 10853928"/>
+              <a:gd name="connsiteY28" fmla="*/ 18288 h 18288"/>
+              <a:gd name="connsiteX29" fmla="*/ 3690336 w 10853928"/>
+              <a:gd name="connsiteY29" fmla="*/ 18288 h 18288"/>
+              <a:gd name="connsiteX30" fmla="*/ 3120504 w 10853928"/>
+              <a:gd name="connsiteY30" fmla="*/ 18288 h 18288"/>
+              <a:gd name="connsiteX31" fmla="*/ 2333595 w 10853928"/>
+              <a:gd name="connsiteY31" fmla="*/ 18288 h 18288"/>
+              <a:gd name="connsiteX32" fmla="*/ 1872303 w 10853928"/>
+              <a:gd name="connsiteY32" fmla="*/ 18288 h 18288"/>
+              <a:gd name="connsiteX33" fmla="*/ 976854 w 10853928"/>
+              <a:gd name="connsiteY33" fmla="*/ 18288 h 18288"/>
+              <a:gd name="connsiteX34" fmla="*/ 0 w 10853928"/>
+              <a:gd name="connsiteY34" fmla="*/ 18288 h 18288"/>
+              <a:gd name="connsiteX35" fmla="*/ 0 w 10853928"/>
+              <a:gd name="connsiteY35" fmla="*/ 0 h 18288"/>
+            </a:gdLst>
+            <a:ahLst/>
+            <a:cxnLst>
+              <a:cxn ang="0">
+                <a:pos x="connsiteX0" y="connsiteY0"/>
+              </a:cxn>
+              <a:cxn ang="0">
+                <a:pos x="connsiteX1" y="connsiteY1"/>
+              </a:cxn>
+              <a:cxn ang="0">
+                <a:pos x="connsiteX2" y="connsiteY2"/>
+              </a:cxn>
+              <a:cxn ang="0">
+                <a:pos x="connsiteX3" y="connsiteY3"/>
+              </a:cxn>
+              <a:cxn ang="0">
+                <a:pos x="connsiteX4" y="connsiteY4"/>
+              </a:cxn>
+              <a:cxn ang="0">
+                <a:pos x="connsiteX5" y="connsiteY5"/>
+              </a:cxn>
+              <a:cxn ang="0">
+                <a:pos x="connsiteX6" y="connsiteY6"/>
+              </a:cxn>
+              <a:cxn ang="0">
+                <a:pos x="connsiteX7" y="connsiteY7"/>
+              </a:cxn>
+              <a:cxn ang="0">
+                <a:pos x="connsiteX8" y="connsiteY8"/>
+              </a:cxn>
+              <a:cxn ang="0">
+                <a:pos x="connsiteX9" y="connsiteY9"/>
+              </a:cxn>
+              <a:cxn ang="0">
+                <a:pos x="connsiteX10" y="connsiteY10"/>
+              </a:cxn>
+              <a:cxn ang="0">
+                <a:pos x="connsiteX11" y="connsiteY11"/>
+              </a:cxn>
+              <a:cxn ang="0">
+                <a:pos x="connsiteX12" y="connsiteY12"/>
+              </a:cxn>
+              <a:cxn ang="0">
+                <a:pos x="connsiteX13" y="connsiteY13"/>
+              </a:cxn>
+              <a:cxn ang="0">
+                <a:pos x="connsiteX14" y="connsiteY14"/>
+              </a:cxn>
+              <a:cxn ang="0">
+                <a:pos x="connsiteX15" y="connsiteY15"/>
+              </a:cxn>
+              <a:cxn ang="0">
+                <a:pos x="connsiteX16" y="connsiteY16"/>
+              </a:cxn>
+              <a:cxn ang="0">
+                <a:pos x="connsiteX17" y="connsiteY17"/>
+              </a:cxn>
+              <a:cxn ang="0">
+                <a:pos x="connsiteX18" y="connsiteY18"/>
+              </a:cxn>
+              <a:cxn ang="0">
+                <a:pos x="connsiteX19" y="connsiteY19"/>
+              </a:cxn>
+              <a:cxn ang="0">
+                <a:pos x="connsiteX20" y="connsiteY20"/>
+              </a:cxn>
+              <a:cxn ang="0">
+                <a:pos x="connsiteX21" y="connsiteY21"/>
+              </a:cxn>
+              <a:cxn ang="0">
+                <a:pos x="connsiteX22" y="connsiteY22"/>
+              </a:cxn>
+              <a:cxn ang="0">
+                <a:pos x="connsiteX23" y="connsiteY23"/>
+              </a:cxn>
+              <a:cxn ang="0">
+                <a:pos x="connsiteX24" y="connsiteY24"/>
+              </a:cxn>
+              <a:cxn ang="0">
+                <a:pos x="connsiteX25" y="connsiteY25"/>
+              </a:cxn>
+              <a:cxn ang="0">
+                <a:pos x="connsiteX26" y="connsiteY26"/>
+              </a:cxn>
+              <a:cxn ang="0">
+                <a:pos x="connsiteX27" y="connsiteY27"/>
+              </a:cxn>
+              <a:cxn ang="0">
+                <a:pos x="connsiteX28" y="connsiteY28"/>
+              </a:cxn>
+              <a:cxn ang="0">
+                <a:pos x="connsiteX29" y="connsiteY29"/>
+              </a:cxn>
+              <a:cxn ang="0">
+                <a:pos x="connsiteX30" y="connsiteY30"/>
+              </a:cxn>
+              <a:cxn ang="0">
+                <a:pos x="connsiteX31" y="connsiteY31"/>
+              </a:cxn>
+              <a:cxn ang="0">
+                <a:pos x="connsiteX32" y="connsiteY32"/>
+              </a:cxn>
+              <a:cxn ang="0">
+                <a:pos x="connsiteX33" y="connsiteY33"/>
+              </a:cxn>
+              <a:cxn ang="0">
+                <a:pos x="connsiteX34" y="connsiteY34"/>
+              </a:cxn>
+              <a:cxn ang="0">
+                <a:pos x="connsiteX35" y="connsiteY35"/>
+              </a:cxn>
+            </a:cxnLst>
+            <a:rect l="l" t="t" r="r" b="b"/>
+            <a:pathLst>
+              <a:path w="10853928" h="18288" fill="none" extrusionOk="0">
+                <a:moveTo>
+                  <a:pt x="0" y="0"/>
+                </a:moveTo>
+                <a:cubicBezTo>
+                  <a:pt x="146993" y="-19076"/>
+                  <a:pt x="347684" y="-4790"/>
+                  <a:pt x="461292" y="0"/>
+                </a:cubicBezTo>
+                <a:cubicBezTo>
+                  <a:pt x="574900" y="4790"/>
+                  <a:pt x="808367" y="19821"/>
+                  <a:pt x="1139662" y="0"/>
+                </a:cubicBezTo>
+                <a:cubicBezTo>
+                  <a:pt x="1470957" y="-19821"/>
+                  <a:pt x="1627405" y="5721"/>
+                  <a:pt x="1926572" y="0"/>
+                </a:cubicBezTo>
+                <a:cubicBezTo>
+                  <a:pt x="2225739" y="-5721"/>
+                  <a:pt x="2137730" y="-3235"/>
+                  <a:pt x="2279325" y="0"/>
+                </a:cubicBezTo>
+                <a:cubicBezTo>
+                  <a:pt x="2420920" y="3235"/>
+                  <a:pt x="2456518" y="9685"/>
+                  <a:pt x="2632078" y="0"/>
+                </a:cubicBezTo>
+                <a:cubicBezTo>
+                  <a:pt x="2807638" y="-9685"/>
+                  <a:pt x="3211516" y="-43007"/>
+                  <a:pt x="3527527" y="0"/>
+                </a:cubicBezTo>
+                <a:cubicBezTo>
+                  <a:pt x="3843538" y="43007"/>
+                  <a:pt x="4058833" y="22042"/>
+                  <a:pt x="4205897" y="0"/>
+                </a:cubicBezTo>
+                <a:cubicBezTo>
+                  <a:pt x="4352961" y="-22042"/>
+                  <a:pt x="4474805" y="-11846"/>
+                  <a:pt x="4558650" y="0"/>
+                </a:cubicBezTo>
+                <a:cubicBezTo>
+                  <a:pt x="4642495" y="11846"/>
+                  <a:pt x="5041928" y="-6069"/>
+                  <a:pt x="5237020" y="0"/>
+                </a:cubicBezTo>
+                <a:cubicBezTo>
+                  <a:pt x="5432112" y="6069"/>
+                  <a:pt x="5943266" y="-17479"/>
+                  <a:pt x="6132469" y="0"/>
+                </a:cubicBezTo>
+                <a:cubicBezTo>
+                  <a:pt x="6321672" y="17479"/>
+                  <a:pt x="6483872" y="26234"/>
+                  <a:pt x="6702301" y="0"/>
+                </a:cubicBezTo>
+                <a:cubicBezTo>
+                  <a:pt x="6920730" y="-26234"/>
+                  <a:pt x="6991194" y="-15156"/>
+                  <a:pt x="7272132" y="0"/>
+                </a:cubicBezTo>
+                <a:cubicBezTo>
+                  <a:pt x="7553070" y="15156"/>
+                  <a:pt x="7684444" y="-32961"/>
+                  <a:pt x="7950502" y="0"/>
+                </a:cubicBezTo>
+                <a:cubicBezTo>
+                  <a:pt x="8216560" y="32961"/>
+                  <a:pt x="8493290" y="-10491"/>
+                  <a:pt x="8737412" y="0"/>
+                </a:cubicBezTo>
+                <a:cubicBezTo>
+                  <a:pt x="8981534" y="10491"/>
+                  <a:pt x="9191586" y="-13899"/>
+                  <a:pt x="9524322" y="0"/>
+                </a:cubicBezTo>
+                <a:cubicBezTo>
+                  <a:pt x="9857058" y="13899"/>
+                  <a:pt x="10297509" y="7485"/>
+                  <a:pt x="10853928" y="0"/>
+                </a:cubicBezTo>
+                <a:cubicBezTo>
+                  <a:pt x="10854574" y="4451"/>
+                  <a:pt x="10854418" y="9226"/>
+                  <a:pt x="10853928" y="18288"/>
+                </a:cubicBezTo>
+                <a:cubicBezTo>
+                  <a:pt x="10691638" y="28522"/>
+                  <a:pt x="10574319" y="29578"/>
+                  <a:pt x="10392636" y="18288"/>
+                </a:cubicBezTo>
+                <a:cubicBezTo>
+                  <a:pt x="10210953" y="6998"/>
+                  <a:pt x="9836277" y="-16742"/>
+                  <a:pt x="9497187" y="18288"/>
+                </a:cubicBezTo>
+                <a:cubicBezTo>
+                  <a:pt x="9158097" y="53318"/>
+                  <a:pt x="9119479" y="30714"/>
+                  <a:pt x="8818817" y="18288"/>
+                </a:cubicBezTo>
+                <a:cubicBezTo>
+                  <a:pt x="8518155" y="5863"/>
+                  <a:pt x="8640037" y="6483"/>
+                  <a:pt x="8466064" y="18288"/>
+                </a:cubicBezTo>
+                <a:cubicBezTo>
+                  <a:pt x="8292091" y="30093"/>
+                  <a:pt x="7997656" y="18914"/>
+                  <a:pt x="7787693" y="18288"/>
+                </a:cubicBezTo>
+                <a:cubicBezTo>
+                  <a:pt x="7577730" y="17662"/>
+                  <a:pt x="7412468" y="21416"/>
+                  <a:pt x="7217862" y="18288"/>
+                </a:cubicBezTo>
+                <a:cubicBezTo>
+                  <a:pt x="7023256" y="15160"/>
+                  <a:pt x="6898018" y="14824"/>
+                  <a:pt x="6648031" y="18288"/>
+                </a:cubicBezTo>
+                <a:cubicBezTo>
+                  <a:pt x="6398044" y="21752"/>
+                  <a:pt x="6254402" y="38625"/>
+                  <a:pt x="6078200" y="18288"/>
+                </a:cubicBezTo>
+                <a:cubicBezTo>
+                  <a:pt x="5901998" y="-2049"/>
+                  <a:pt x="5622886" y="3213"/>
+                  <a:pt x="5508368" y="18288"/>
+                </a:cubicBezTo>
+                <a:cubicBezTo>
+                  <a:pt x="5393850" y="33363"/>
+                  <a:pt x="5036260" y="26830"/>
+                  <a:pt x="4721459" y="18288"/>
+                </a:cubicBezTo>
+                <a:cubicBezTo>
+                  <a:pt x="4406658" y="9746"/>
+                  <a:pt x="4239221" y="41551"/>
+                  <a:pt x="4043088" y="18288"/>
+                </a:cubicBezTo>
+                <a:cubicBezTo>
+                  <a:pt x="3846955" y="-4975"/>
+                  <a:pt x="3818802" y="34658"/>
+                  <a:pt x="3690336" y="18288"/>
+                </a:cubicBezTo>
+                <a:cubicBezTo>
+                  <a:pt x="3561870" y="1918"/>
+                  <a:pt x="3265491" y="42194"/>
+                  <a:pt x="3120504" y="18288"/>
+                </a:cubicBezTo>
+                <a:cubicBezTo>
+                  <a:pt x="2975517" y="-5618"/>
+                  <a:pt x="2720254" y="36673"/>
+                  <a:pt x="2333595" y="18288"/>
+                </a:cubicBezTo>
+                <a:cubicBezTo>
+                  <a:pt x="1946936" y="-97"/>
+                  <a:pt x="2097241" y="5776"/>
+                  <a:pt x="1872303" y="18288"/>
+                </a:cubicBezTo>
+                <a:cubicBezTo>
+                  <a:pt x="1647365" y="30800"/>
+                  <a:pt x="1282708" y="45380"/>
+                  <a:pt x="976854" y="18288"/>
+                </a:cubicBezTo>
+                <a:cubicBezTo>
+                  <a:pt x="671000" y="-8804"/>
+                  <a:pt x="408401" y="-12775"/>
+                  <a:pt x="0" y="18288"/>
+                </a:cubicBezTo>
+                <a:cubicBezTo>
+                  <a:pt x="-213" y="9468"/>
+                  <a:pt x="187" y="4459"/>
+                  <a:pt x="0" y="0"/>
+                </a:cubicBezTo>
+                <a:close/>
+              </a:path>
+              <a:path w="10853928" h="18288" stroke="0" extrusionOk="0">
+                <a:moveTo>
+                  <a:pt x="0" y="0"/>
+                </a:moveTo>
+                <a:cubicBezTo>
+                  <a:pt x="267322" y="15284"/>
+                  <a:pt x="415388" y="-21048"/>
+                  <a:pt x="569831" y="0"/>
+                </a:cubicBezTo>
+                <a:cubicBezTo>
+                  <a:pt x="724274" y="21048"/>
+                  <a:pt x="769333" y="-2353"/>
+                  <a:pt x="922584" y="0"/>
+                </a:cubicBezTo>
+                <a:cubicBezTo>
+                  <a:pt x="1075835" y="2353"/>
+                  <a:pt x="1399490" y="-145"/>
+                  <a:pt x="1818033" y="0"/>
+                </a:cubicBezTo>
+                <a:cubicBezTo>
+                  <a:pt x="2236576" y="145"/>
+                  <a:pt x="2145330" y="5482"/>
+                  <a:pt x="2387864" y="0"/>
+                </a:cubicBezTo>
+                <a:cubicBezTo>
+                  <a:pt x="2630398" y="-5482"/>
+                  <a:pt x="2793207" y="18487"/>
+                  <a:pt x="2957695" y="0"/>
+                </a:cubicBezTo>
+                <a:cubicBezTo>
+                  <a:pt x="3122183" y="-18487"/>
+                  <a:pt x="3579141" y="19003"/>
+                  <a:pt x="3853144" y="0"/>
+                </a:cubicBezTo>
+                <a:cubicBezTo>
+                  <a:pt x="4127147" y="-19003"/>
+                  <a:pt x="4209857" y="12211"/>
+                  <a:pt x="4314436" y="0"/>
+                </a:cubicBezTo>
+                <a:cubicBezTo>
+                  <a:pt x="4419015" y="-12211"/>
+                  <a:pt x="4762459" y="-17220"/>
+                  <a:pt x="5209885" y="0"/>
+                </a:cubicBezTo>
+                <a:cubicBezTo>
+                  <a:pt x="5657311" y="17220"/>
+                  <a:pt x="5692663" y="-3290"/>
+                  <a:pt x="6105335" y="0"/>
+                </a:cubicBezTo>
+                <a:cubicBezTo>
+                  <a:pt x="6518007" y="3290"/>
+                  <a:pt x="6455516" y="-5124"/>
+                  <a:pt x="6783705" y="0"/>
+                </a:cubicBezTo>
+                <a:cubicBezTo>
+                  <a:pt x="7111894" y="5124"/>
+                  <a:pt x="7441941" y="-17829"/>
+                  <a:pt x="7679154" y="0"/>
+                </a:cubicBezTo>
+                <a:cubicBezTo>
+                  <a:pt x="7916367" y="17829"/>
+                  <a:pt x="8102967" y="-24363"/>
+                  <a:pt x="8248985" y="0"/>
+                </a:cubicBezTo>
+                <a:cubicBezTo>
+                  <a:pt x="8395003" y="24363"/>
+                  <a:pt x="8552393" y="25505"/>
+                  <a:pt x="8818817" y="0"/>
+                </a:cubicBezTo>
+                <a:cubicBezTo>
+                  <a:pt x="9085241" y="-25505"/>
+                  <a:pt x="9411308" y="38000"/>
+                  <a:pt x="9605726" y="0"/>
+                </a:cubicBezTo>
+                <a:cubicBezTo>
+                  <a:pt x="9800144" y="-38000"/>
+                  <a:pt x="10006468" y="-25741"/>
+                  <a:pt x="10175558" y="0"/>
+                </a:cubicBezTo>
+                <a:cubicBezTo>
+                  <a:pt x="10344648" y="25741"/>
+                  <a:pt x="10696282" y="695"/>
+                  <a:pt x="10853928" y="0"/>
+                </a:cubicBezTo>
+                <a:cubicBezTo>
+                  <a:pt x="10853521" y="8690"/>
+                  <a:pt x="10853774" y="14141"/>
+                  <a:pt x="10853928" y="18288"/>
+                </a:cubicBezTo>
+                <a:cubicBezTo>
+                  <a:pt x="10608124" y="24255"/>
+                  <a:pt x="10343415" y="22307"/>
+                  <a:pt x="10067018" y="18288"/>
+                </a:cubicBezTo>
+                <a:cubicBezTo>
+                  <a:pt x="9790621" y="14270"/>
+                  <a:pt x="9843266" y="3564"/>
+                  <a:pt x="9714266" y="18288"/>
+                </a:cubicBezTo>
+                <a:cubicBezTo>
+                  <a:pt x="9585266" y="33012"/>
+                  <a:pt x="9379484" y="1875"/>
+                  <a:pt x="9252974" y="18288"/>
+                </a:cubicBezTo>
+                <a:cubicBezTo>
+                  <a:pt x="9126464" y="34701"/>
+                  <a:pt x="8580678" y="-4904"/>
+                  <a:pt x="8357525" y="18288"/>
+                </a:cubicBezTo>
+                <a:cubicBezTo>
+                  <a:pt x="8134372" y="41480"/>
+                  <a:pt x="7903199" y="26458"/>
+                  <a:pt x="7679154" y="18288"/>
+                </a:cubicBezTo>
+                <a:cubicBezTo>
+                  <a:pt x="7455109" y="10118"/>
+                  <a:pt x="7435944" y="27109"/>
+                  <a:pt x="7217862" y="18288"/>
+                </a:cubicBezTo>
+                <a:cubicBezTo>
+                  <a:pt x="6999780" y="9467"/>
+                  <a:pt x="6680409" y="18985"/>
+                  <a:pt x="6539492" y="18288"/>
+                </a:cubicBezTo>
+                <a:cubicBezTo>
+                  <a:pt x="6398575" y="17592"/>
+                  <a:pt x="6312077" y="33018"/>
+                  <a:pt x="6186739" y="18288"/>
+                </a:cubicBezTo>
+                <a:cubicBezTo>
+                  <a:pt x="6061401" y="3558"/>
+                  <a:pt x="5947033" y="12075"/>
+                  <a:pt x="5833986" y="18288"/>
+                </a:cubicBezTo>
+                <a:cubicBezTo>
+                  <a:pt x="5720939" y="24501"/>
+                  <a:pt x="5482226" y="8586"/>
+                  <a:pt x="5155616" y="18288"/>
+                </a:cubicBezTo>
+                <a:cubicBezTo>
+                  <a:pt x="4829006" y="27991"/>
+                  <a:pt x="4841274" y="29316"/>
+                  <a:pt x="4694324" y="18288"/>
+                </a:cubicBezTo>
+                <a:cubicBezTo>
+                  <a:pt x="4547374" y="7260"/>
+                  <a:pt x="4077675" y="7013"/>
+                  <a:pt x="3907414" y="18288"/>
+                </a:cubicBezTo>
+                <a:cubicBezTo>
+                  <a:pt x="3737153" y="29564"/>
+                  <a:pt x="3538393" y="21630"/>
+                  <a:pt x="3446122" y="18288"/>
+                </a:cubicBezTo>
+                <a:cubicBezTo>
+                  <a:pt x="3353851" y="14946"/>
+                  <a:pt x="2990320" y="-8091"/>
+                  <a:pt x="2659212" y="18288"/>
+                </a:cubicBezTo>
+                <a:cubicBezTo>
+                  <a:pt x="2328104" y="44667"/>
+                  <a:pt x="2427653" y="9607"/>
+                  <a:pt x="2306460" y="18288"/>
+                </a:cubicBezTo>
+                <a:cubicBezTo>
+                  <a:pt x="2185267" y="26969"/>
+                  <a:pt x="1719763" y="3717"/>
+                  <a:pt x="1519550" y="18288"/>
+                </a:cubicBezTo>
+                <a:cubicBezTo>
+                  <a:pt x="1319337" y="32860"/>
+                  <a:pt x="1167371" y="17040"/>
+                  <a:pt x="1058258" y="18288"/>
+                </a:cubicBezTo>
+                <a:cubicBezTo>
+                  <a:pt x="949145" y="19536"/>
+                  <a:pt x="780234" y="31447"/>
+                  <a:pt x="705505" y="18288"/>
+                </a:cubicBezTo>
+                <a:cubicBezTo>
+                  <a:pt x="630776" y="5129"/>
+                  <a:pt x="215796" y="30056"/>
+                  <a:pt x="0" y="18288"/>
+                </a:cubicBezTo>
+                <a:cubicBezTo>
+                  <a:pt x="-53" y="11301"/>
+                  <a:pt x="-649" y="7756"/>
+                  <a:pt x="0" y="0"/>
+                </a:cubicBezTo>
+                <a:close/>
+              </a:path>
+            </a:pathLst>
+          </a:custGeom>
+          <a:solidFill>
+            <a:schemeClr val="accent2"/>
+          </a:solidFill>
+          <a:ln w="41275" cap="rnd">
+            <a:solidFill>
+              <a:schemeClr val="accent2"/>
+            </a:solidFill>
+            <a:round/>
+            <a:extLst>
+              <a:ext uri="{C807C97D-BFC1-408E-A445-0C87EB9F89A2}">
+                <ask:lineSketchStyleProps xmlns:ask="http://schemas.microsoft.com/office/drawing/2018/sketchyshapes" sd="1219033472">
+                  <a:prstGeom prst="rect">
+                    <a:avLst/>
+                  </a:prstGeom>
+                  <ask:type>
+                    <ask:lineSketchFreehand/>
+                  </ask:type>
+                </ask:lineSketchStyleProps>
+              </a:ext>
+            </a:extLst>
+          </a:ln>
+        </p:spPr>
+        <p:style>
+          <a:lnRef idx="2">
+            <a:schemeClr val="accent1">
+              <a:shade val="50000"/>
+            </a:schemeClr>
+          </a:lnRef>
+          <a:fillRef idx="1">
+            <a:schemeClr val="accent1"/>
+          </a:fillRef>
+          <a:effectRef idx="0">
+            <a:schemeClr val="accent1"/>
+          </a:effectRef>
+          <a:fontRef idx="minor">
+            <a:schemeClr val="lt1"/>
+          </a:fontRef>
+        </p:style>
+        <p:txBody>
+          <a:bodyPr rtlCol="0" anchor="ctr"/>
+          <a:lstStyle/>
+          <a:p>
+            <a:pPr algn="ctr"/>
+            <a:endParaRPr lang="en-US"/>
+          </a:p>
+        </p:txBody>
+      </p:sp>
+      <p:sp>
+        <p:nvSpPr>
+          <p:cNvPr id="3" name="Content Placeholder 2">
+            <a:extLst>
+              <a:ext uri="{FF2B5EF4-FFF2-40B4-BE49-F238E27FC236}">
+                <a16:creationId xmlns:a16="http://schemas.microsoft.com/office/drawing/2014/main" id="{95A6E99C-8071-4439-8447-87E6FBF48BD1}"/>
+              </a:ext>
+            </a:extLst>
+          </p:cNvPr>
+          <p:cNvSpPr>
+            <a:spLocks noGrp="1"/>
+          </p:cNvSpPr>
+          <p:nvPr>
+            <p:ph idx="1"/>
+          </p:nvPr>
+        </p:nvSpPr>
+        <p:spPr>
+          <a:xfrm>
+            <a:off x="838200" y="1929384"/>
+            <a:ext cx="10515600" cy="4251960"/>
+          </a:xfrm>
+        </p:spPr>
+        <p:txBody>
+          <a:bodyPr>
+            <a:normAutofit/>
+          </a:bodyPr>
+          <a:lstStyle/>
+          <a:p>
+            <a:pPr marL="457200" lvl="1" indent="0">
+              <a:buNone/>
+            </a:pPr>
+            <a:r>
+              <a:rPr lang="nl-BE" sz="2200" dirty="0"/>
+              <a:t>3. Server</a:t>
+            </a:r>
+          </a:p>
+          <a:p>
+            <a:pPr marL="1428750" lvl="2" indent="-514350">
+              <a:buFont typeface="+mj-lt"/>
+              <a:buAutoNum type="romanUcPeriod"/>
+            </a:pPr>
+            <a:r>
+              <a:rPr lang="nl-BE" sz="2200" dirty="0"/>
+              <a:t>DDL</a:t>
+            </a:r>
+          </a:p>
+          <a:p>
+            <a:pPr marL="1428750" lvl="2" indent="-514350">
+              <a:buFont typeface="+mj-lt"/>
+              <a:buAutoNum type="romanUcPeriod"/>
+            </a:pPr>
+            <a:r>
+              <a:rPr lang="nl-BE" sz="2200" dirty="0"/>
+              <a:t>DML</a:t>
+            </a:r>
+          </a:p>
+          <a:p>
+            <a:endParaRPr lang="nl-BE" sz="2200" dirty="0"/>
+          </a:p>
+        </p:txBody>
+      </p:sp>
+    </p:spTree>
+    <p:extLst>
+      <p:ext uri="{BB962C8B-B14F-4D97-AF65-F5344CB8AC3E}">
+        <p14:creationId xmlns:p14="http://schemas.microsoft.com/office/powerpoint/2010/main" val="862526935"/>
       </p:ext>
     </p:extLst>
   </p:cSld>

</xml_diff>